<commit_message>
Desktop done but Ansible - Cloud Computing flushed out
</commit_message>
<xml_diff>
--- a/Dev Ops Course.pptx
+++ b/Dev Ops Course.pptx
@@ -28,6 +28,7 @@
     <p:sldId id="271" r:id="rId21"/>
     <p:sldId id="272" r:id="rId22"/>
     <p:sldId id="273" r:id="rId23"/>
+    <p:sldId id="274" r:id="rId24"/>
   </p:sldIdLst>
   <p:sldSz cx="9144000" cy="6858000"/>
   <p:notesSz cx="6858000" cy="9144000"/>
@@ -246,7 +247,7 @@
           <a:bodyPr lIns="0" rIns="0" tIns="0" bIns="0" anchor="b"/>
           <a:p>
             <a:pPr algn="r"/>
-            <a:fld id="{4EB2DE12-B0A2-410B-B488-1859B574B21B}" type="slidenum">
+            <a:fld id="{6D53F023-19AB-4C05-86B9-3F21A13B2051}" type="slidenum">
               <a:rPr b="0" lang="en-CA" sz="1400" spc="-1" strike="noStrike">
                 <a:latin typeface="Times New Roman"/>
               </a:rPr>
@@ -264,7 +265,7 @@
 </p:notesMaster>
 </file>
 
-<file path=ppt/notesSlides/notesSlide18.xml><?xml version="1.0" encoding="utf-8"?>
+<file path=ppt/notesSlides/notesSlide19.xml><?xml version="1.0" encoding="utf-8"?>
 <p:notes xmlns:a="http://schemas.openxmlformats.org/drawingml/2006/main" xmlns:p="http://schemas.openxmlformats.org/presentationml/2006/main" xmlns:r="http://schemas.openxmlformats.org/officeDocument/2006/relationships" xmlns:p14="http://schemas.microsoft.com/office/powerpoint/2010/main" xmlns:p15="http://schemas.microsoft.com/office/powerpoint/2012/main" xmlns:mc="http://schemas.openxmlformats.org/markup-compatibility/2006">
   <p:cSld>
     <p:spTree>
@@ -283,7 +284,7 @@
       </p:grpSpPr>
       <p:sp>
         <p:nvSpPr>
-          <p:cNvPr id="204" name="PlaceHolder 1"/>
+          <p:cNvPr id="209" name="PlaceHolder 1"/>
           <p:cNvSpPr>
             <a:spLocks noGrp="1"/>
           </p:cNvSpPr>
@@ -294,16 +295,16 @@
         <p:spPr>
           <a:xfrm>
             <a:off x="1143000" y="685800"/>
-            <a:ext cx="4567320" cy="3424320"/>
-          </a:xfrm>
-          <a:prstGeom prst="rect">
-            <a:avLst/>
-          </a:prstGeom>
-        </p:spPr>
-      </p:sp>
-      <p:sp>
-        <p:nvSpPr>
-          <p:cNvPr id="205" name="PlaceHolder 2"/>
+            <a:ext cx="4566960" cy="3423960"/>
+          </a:xfrm>
+          <a:prstGeom prst="rect">
+            <a:avLst/>
+          </a:prstGeom>
+        </p:spPr>
+      </p:sp>
+      <p:sp>
+        <p:nvSpPr>
+          <p:cNvPr id="210" name="PlaceHolder 2"/>
           <p:cNvSpPr>
             <a:spLocks noGrp="1"/>
           </p:cNvSpPr>
@@ -314,7 +315,7 @@
         <p:spPr>
           <a:xfrm>
             <a:off x="685800" y="4343400"/>
-            <a:ext cx="5481720" cy="4110120"/>
+            <a:ext cx="5481360" cy="4109760"/>
           </a:xfrm>
           <a:prstGeom prst="rect">
             <a:avLst/>
@@ -331,14 +332,14 @@
       </p:sp>
       <p:sp>
         <p:nvSpPr>
-          <p:cNvPr id="206" name="CustomShape 3"/>
+          <p:cNvPr id="211" name="CustomShape 3"/>
           <p:cNvSpPr/>
           <p:nvPr/>
         </p:nvSpPr>
         <p:spPr>
           <a:xfrm>
             <a:off x="3884760" y="8685360"/>
-            <a:ext cx="2967120" cy="452520"/>
+            <a:ext cx="2966760" cy="452160"/>
           </a:xfrm>
           <a:prstGeom prst="rect">
             <a:avLst/>
@@ -5163,7 +5164,7 @@
         <p:spPr>
           <a:xfrm>
             <a:off x="-71640" y="3240000"/>
-            <a:ext cx="9139320" cy="3568320"/>
+            <a:ext cx="9138960" cy="3567960"/>
           </a:xfrm>
           <a:prstGeom prst="rect">
             <a:avLst/>
@@ -5267,7 +5268,7 @@
         <p:spPr>
           <a:xfrm>
             <a:off x="3311640" y="1268640"/>
-            <a:ext cx="2263680" cy="660960"/>
+            <a:ext cx="2263320" cy="660600"/>
           </a:xfrm>
           <a:prstGeom prst="rect">
             <a:avLst/>
@@ -5342,7 +5343,7 @@
         <p:spPr>
           <a:xfrm>
             <a:off x="432000" y="13680"/>
-            <a:ext cx="7447680" cy="1179720"/>
+            <a:ext cx="7447320" cy="1179360"/>
           </a:xfrm>
           <a:prstGeom prst="rect">
             <a:avLst/>
@@ -5413,7 +5414,7 @@
         <p:spPr>
           <a:xfrm>
             <a:off x="0" y="0"/>
-            <a:ext cx="246960" cy="1191960"/>
+            <a:ext cx="246600" cy="1191600"/>
           </a:xfrm>
           <a:prstGeom prst="rect">
             <a:avLst/>
@@ -5483,7 +5484,7 @@
         <p:spPr>
           <a:xfrm>
             <a:off x="457200" y="273600"/>
-            <a:ext cx="8226000" cy="5304600"/>
+            <a:ext cx="8225640" cy="5304240"/>
           </a:xfrm>
           <a:prstGeom prst="rect">
             <a:avLst/>
@@ -5532,7 +5533,7 @@
         <p:spPr>
           <a:xfrm>
             <a:off x="576000" y="1728000"/>
-            <a:ext cx="6764760" cy="2390760"/>
+            <a:ext cx="6764400" cy="2390400"/>
           </a:xfrm>
           <a:prstGeom prst="rect">
             <a:avLst/>
@@ -5741,7 +5742,7 @@
         <p:spPr>
           <a:xfrm>
             <a:off x="432000" y="13680"/>
-            <a:ext cx="7447680" cy="1179720"/>
+            <a:ext cx="7447320" cy="1179360"/>
           </a:xfrm>
           <a:prstGeom prst="rect">
             <a:avLst/>
@@ -5812,7 +5813,7 @@
         <p:spPr>
           <a:xfrm>
             <a:off x="0" y="0"/>
-            <a:ext cx="246960" cy="1191960"/>
+            <a:ext cx="246600" cy="1191600"/>
           </a:xfrm>
           <a:prstGeom prst="rect">
             <a:avLst/>
@@ -5882,7 +5883,7 @@
         <p:spPr>
           <a:xfrm>
             <a:off x="457200" y="273600"/>
-            <a:ext cx="8226000" cy="5304600"/>
+            <a:ext cx="8225640" cy="5304240"/>
           </a:xfrm>
           <a:prstGeom prst="rect">
             <a:avLst/>
@@ -5931,7 +5932,7 @@
         <p:spPr>
           <a:xfrm>
             <a:off x="576000" y="1728000"/>
-            <a:ext cx="6764760" cy="2390760"/>
+            <a:ext cx="6764400" cy="2390400"/>
           </a:xfrm>
           <a:prstGeom prst="rect">
             <a:avLst/>
@@ -6358,7 +6359,7 @@
         <p:spPr>
           <a:xfrm>
             <a:off x="432000" y="13680"/>
-            <a:ext cx="7447680" cy="1179720"/>
+            <a:ext cx="7447320" cy="1179360"/>
           </a:xfrm>
           <a:prstGeom prst="rect">
             <a:avLst/>
@@ -6429,7 +6430,7 @@
         <p:spPr>
           <a:xfrm>
             <a:off x="0" y="0"/>
-            <a:ext cx="246960" cy="1191960"/>
+            <a:ext cx="246600" cy="1191600"/>
           </a:xfrm>
           <a:prstGeom prst="rect">
             <a:avLst/>
@@ -6499,7 +6500,7 @@
         <p:spPr>
           <a:xfrm>
             <a:off x="457200" y="273600"/>
-            <a:ext cx="8226000" cy="5304600"/>
+            <a:ext cx="8225640" cy="5304240"/>
           </a:xfrm>
           <a:prstGeom prst="rect">
             <a:avLst/>
@@ -6548,7 +6549,7 @@
         <p:spPr>
           <a:xfrm>
             <a:off x="576000" y="1728000"/>
-            <a:ext cx="6764760" cy="2390760"/>
+            <a:ext cx="6764400" cy="2390400"/>
           </a:xfrm>
           <a:prstGeom prst="rect">
             <a:avLst/>
@@ -6893,7 +6894,7 @@
         <p:spPr>
           <a:xfrm>
             <a:off x="432000" y="13680"/>
-            <a:ext cx="7447680" cy="1179720"/>
+            <a:ext cx="7447320" cy="1179360"/>
           </a:xfrm>
           <a:prstGeom prst="rect">
             <a:avLst/>
@@ -6954,7 +6955,7 @@
         <p:spPr>
           <a:xfrm>
             <a:off x="0" y="0"/>
-            <a:ext cx="246960" cy="1191960"/>
+            <a:ext cx="246600" cy="1191600"/>
           </a:xfrm>
           <a:prstGeom prst="rect">
             <a:avLst/>
@@ -7024,7 +7025,7 @@
         <p:spPr>
           <a:xfrm>
             <a:off x="457200" y="273600"/>
-            <a:ext cx="8226000" cy="5304600"/>
+            <a:ext cx="8225640" cy="5304240"/>
           </a:xfrm>
           <a:prstGeom prst="rect">
             <a:avLst/>
@@ -7073,7 +7074,7 @@
         <p:spPr>
           <a:xfrm>
             <a:off x="576000" y="1728000"/>
-            <a:ext cx="6764760" cy="2390760"/>
+            <a:ext cx="6764400" cy="2390400"/>
           </a:xfrm>
           <a:prstGeom prst="rect">
             <a:avLst/>
@@ -7383,7 +7384,7 @@
         <p:spPr>
           <a:xfrm>
             <a:off x="432000" y="13680"/>
-            <a:ext cx="7447680" cy="1179720"/>
+            <a:ext cx="7447320" cy="1179360"/>
           </a:xfrm>
           <a:prstGeom prst="rect">
             <a:avLst/>
@@ -7444,7 +7445,7 @@
         <p:spPr>
           <a:xfrm>
             <a:off x="0" y="0"/>
-            <a:ext cx="246960" cy="1191960"/>
+            <a:ext cx="246600" cy="1191600"/>
           </a:xfrm>
           <a:prstGeom prst="rect">
             <a:avLst/>
@@ -7514,7 +7515,7 @@
         <p:spPr>
           <a:xfrm>
             <a:off x="457200" y="273600"/>
-            <a:ext cx="8226000" cy="5304600"/>
+            <a:ext cx="8225640" cy="5304240"/>
           </a:xfrm>
           <a:prstGeom prst="rect">
             <a:avLst/>
@@ -7563,7 +7564,7 @@
         <p:spPr>
           <a:xfrm>
             <a:off x="576000" y="1728000"/>
-            <a:ext cx="6764760" cy="2390760"/>
+            <a:ext cx="6764400" cy="2390400"/>
           </a:xfrm>
           <a:prstGeom prst="rect">
             <a:avLst/>
@@ -7888,7 +7889,7 @@
         <p:spPr>
           <a:xfrm>
             <a:off x="432000" y="13680"/>
-            <a:ext cx="7447680" cy="1179720"/>
+            <a:ext cx="7447320" cy="1179360"/>
           </a:xfrm>
           <a:prstGeom prst="rect">
             <a:avLst/>
@@ -7949,7 +7950,7 @@
         <p:spPr>
           <a:xfrm>
             <a:off x="0" y="0"/>
-            <a:ext cx="246960" cy="1191960"/>
+            <a:ext cx="246600" cy="1191600"/>
           </a:xfrm>
           <a:prstGeom prst="rect">
             <a:avLst/>
@@ -8019,7 +8020,7 @@
         <p:spPr>
           <a:xfrm>
             <a:off x="457200" y="273600"/>
-            <a:ext cx="8226000" cy="5304600"/>
+            <a:ext cx="8225640" cy="5304240"/>
           </a:xfrm>
           <a:prstGeom prst="rect">
             <a:avLst/>
@@ -8068,7 +8069,7 @@
         <p:spPr>
           <a:xfrm>
             <a:off x="576000" y="1728000"/>
-            <a:ext cx="6764760" cy="2390760"/>
+            <a:ext cx="6764400" cy="2390400"/>
           </a:xfrm>
           <a:prstGeom prst="rect">
             <a:avLst/>
@@ -8393,7 +8394,7 @@
         <p:spPr>
           <a:xfrm>
             <a:off x="432000" y="13680"/>
-            <a:ext cx="7447680" cy="1179720"/>
+            <a:ext cx="7447320" cy="1179360"/>
           </a:xfrm>
           <a:prstGeom prst="rect">
             <a:avLst/>
@@ -8454,7 +8455,7 @@
         <p:spPr>
           <a:xfrm>
             <a:off x="0" y="0"/>
-            <a:ext cx="246960" cy="1191960"/>
+            <a:ext cx="246600" cy="1191600"/>
           </a:xfrm>
           <a:prstGeom prst="rect">
             <a:avLst/>
@@ -8524,7 +8525,7 @@
         <p:spPr>
           <a:xfrm>
             <a:off x="457200" y="273600"/>
-            <a:ext cx="8226000" cy="5304600"/>
+            <a:ext cx="8225640" cy="5304240"/>
           </a:xfrm>
           <a:prstGeom prst="rect">
             <a:avLst/>
@@ -8573,7 +8574,7 @@
         <p:spPr>
           <a:xfrm>
             <a:off x="576000" y="1728000"/>
-            <a:ext cx="6764760" cy="2390760"/>
+            <a:ext cx="6764400" cy="2390400"/>
           </a:xfrm>
           <a:prstGeom prst="rect">
             <a:avLst/>
@@ -8598,6 +8599,36 @@
               </a:lnSpc>
             </a:pPr>
             <a:r>
+              <a:rPr b="0" lang="en-CA" sz="1800" spc="-1" strike="noStrike">
+                <a:solidFill>
+                  <a:srgbClr val="000000"/>
+                </a:solidFill>
+                <a:latin typeface="Arial"/>
+                <a:ea typeface="DejaVu Sans"/>
+              </a:rPr>
+              <a:t>Now that we know what cloud computing is, there are several different vendors that offer these services.  They are:</a:t>
+            </a:r>
+            <a:endParaRPr b="0" lang="en-CA" sz="1800" spc="-1" strike="noStrike">
+              <a:latin typeface="Arial"/>
+            </a:endParaRPr>
+          </a:p>
+          <a:p>
+            <a:pPr>
+              <a:lnSpc>
+                <a:spcPct val="100000"/>
+              </a:lnSpc>
+            </a:pPr>
+            <a:endParaRPr b="0" lang="en-CA" sz="1800" spc="-1" strike="noStrike">
+              <a:latin typeface="Arial"/>
+            </a:endParaRPr>
+          </a:p>
+          <a:p>
+            <a:pPr>
+              <a:lnSpc>
+                <a:spcPct val="100000"/>
+              </a:lnSpc>
+            </a:pPr>
+            <a:r>
               <a:rPr b="1" lang="en-CA" sz="1800" spc="-1" strike="noStrike">
                 <a:solidFill>
                   <a:srgbClr val="000000"/>
@@ -8605,71 +8636,107 @@
                 <a:latin typeface="Arial"/>
                 <a:ea typeface="DejaVu Sans"/>
               </a:rPr>
-              <a:t>Resources</a:t>
-            </a:r>
-            <a:endParaRPr b="0" lang="en-CA" sz="1800" spc="-1" strike="noStrike">
-              <a:latin typeface="Arial"/>
-            </a:endParaRPr>
-          </a:p>
-          <a:p>
-            <a:pPr>
-              <a:lnSpc>
-                <a:spcPct val="100000"/>
-              </a:lnSpc>
-            </a:pPr>
-            <a:endParaRPr b="0" lang="en-CA" sz="1800" spc="-1" strike="noStrike">
-              <a:latin typeface="Arial"/>
-            </a:endParaRPr>
-          </a:p>
-          <a:p>
-            <a:pPr>
-              <a:lnSpc>
-                <a:spcPct val="100000"/>
-              </a:lnSpc>
-            </a:pPr>
-            <a:r>
-              <a:rPr b="0" lang="en-CA" sz="1800" spc="-1" strike="noStrike" u="sng">
-                <a:solidFill>
-                  <a:srgbClr val="0000ff"/>
-                </a:solidFill>
-                <a:uFillTx/>
-                <a:latin typeface="Arial"/>
-                <a:ea typeface="DejaVu Sans"/>
-                <a:hlinkClick r:id="rId1"/>
-              </a:rPr>
-              <a:t>https://www.youtube.com/watch?v=m0a2CzgLNsc</a:t>
-            </a:r>
-            <a:endParaRPr b="0" lang="en-CA" sz="1800" spc="-1" strike="noStrike">
-              <a:latin typeface="Arial"/>
-            </a:endParaRPr>
-          </a:p>
-          <a:p>
-            <a:pPr>
-              <a:lnSpc>
-                <a:spcPct val="100000"/>
-              </a:lnSpc>
-            </a:pPr>
-            <a:endParaRPr b="0" lang="en-CA" sz="1800" spc="-1" strike="noStrike">
-              <a:latin typeface="Arial"/>
-            </a:endParaRPr>
-          </a:p>
-          <a:p>
-            <a:pPr>
-              <a:lnSpc>
-                <a:spcPct val="100000"/>
-              </a:lnSpc>
-            </a:pPr>
-            <a:r>
-              <a:rPr b="0" lang="en-CA" sz="1800" spc="-1" strike="noStrike" u="sng">
-                <a:solidFill>
-                  <a:srgbClr val="0000ff"/>
-                </a:solidFill>
-                <a:uFillTx/>
-                <a:latin typeface="Arial"/>
-                <a:ea typeface="DejaVu Sans"/>
-                <a:hlinkClick r:id="rId2"/>
-              </a:rPr>
-              <a:t>https://www.youtube.com/watch?v=LFkGtg-ZTko</a:t>
+              <a:t>Amazon Web Services (AWS)</a:t>
+            </a:r>
+            <a:endParaRPr b="0" lang="en-CA" sz="1800" spc="-1" strike="noStrike">
+              <a:latin typeface="Arial"/>
+            </a:endParaRPr>
+          </a:p>
+          <a:p>
+            <a:pPr>
+              <a:lnSpc>
+                <a:spcPct val="100000"/>
+              </a:lnSpc>
+            </a:pPr>
+            <a:r>
+              <a:rPr b="1" lang="en-CA" sz="1800" spc="-1" strike="noStrike">
+                <a:solidFill>
+                  <a:srgbClr val="000000"/>
+                </a:solidFill>
+                <a:latin typeface="Arial"/>
+                <a:ea typeface="DejaVu Sans"/>
+              </a:rPr>
+              <a:t>Microsoft Azure  (AZURE)</a:t>
+            </a:r>
+            <a:endParaRPr b="0" lang="en-CA" sz="1800" spc="-1" strike="noStrike">
+              <a:latin typeface="Arial"/>
+            </a:endParaRPr>
+          </a:p>
+          <a:p>
+            <a:pPr>
+              <a:lnSpc>
+                <a:spcPct val="100000"/>
+              </a:lnSpc>
+            </a:pPr>
+            <a:r>
+              <a:rPr b="1" lang="en-CA" sz="1800" spc="-1" strike="noStrike">
+                <a:solidFill>
+                  <a:srgbClr val="000000"/>
+                </a:solidFill>
+                <a:latin typeface="Arial"/>
+                <a:ea typeface="DejaVu Sans"/>
+              </a:rPr>
+              <a:t>Google Cloud Platform (GCP)</a:t>
+            </a:r>
+            <a:endParaRPr b="0" lang="en-CA" sz="1800" spc="-1" strike="noStrike">
+              <a:latin typeface="Arial"/>
+            </a:endParaRPr>
+          </a:p>
+          <a:p>
+            <a:pPr>
+              <a:lnSpc>
+                <a:spcPct val="100000"/>
+              </a:lnSpc>
+            </a:pPr>
+            <a:endParaRPr b="0" lang="en-CA" sz="1800" spc="-1" strike="noStrike">
+              <a:latin typeface="Arial"/>
+            </a:endParaRPr>
+          </a:p>
+          <a:p>
+            <a:pPr>
+              <a:lnSpc>
+                <a:spcPct val="100000"/>
+              </a:lnSpc>
+            </a:pPr>
+            <a:r>
+              <a:rPr b="0" lang="en-CA" sz="1800" spc="-1" strike="noStrike">
+                <a:solidFill>
+                  <a:srgbClr val="000000"/>
+                </a:solidFill>
+                <a:latin typeface="Arial"/>
+                <a:ea typeface="DejaVu Sans"/>
+              </a:rPr>
+              <a:t>And a few others.</a:t>
+            </a:r>
+            <a:endParaRPr b="0" lang="en-CA" sz="1800" spc="-1" strike="noStrike">
+              <a:latin typeface="Arial"/>
+            </a:endParaRPr>
+          </a:p>
+          <a:p>
+            <a:pPr>
+              <a:lnSpc>
+                <a:spcPct val="100000"/>
+              </a:lnSpc>
+            </a:pPr>
+            <a:endParaRPr b="0" lang="en-CA" sz="1800" spc="-1" strike="noStrike">
+              <a:latin typeface="Arial"/>
+            </a:endParaRPr>
+          </a:p>
+          <a:p>
+            <a:pPr>
+              <a:lnSpc>
+                <a:spcPct val="100000"/>
+              </a:lnSpc>
+            </a:pPr>
+            <a:r>
+              <a:rPr b="0" lang="en-CA" sz="1800" spc="-1" strike="noStrike">
+                <a:solidFill>
+                  <a:srgbClr val="000000"/>
+                </a:solidFill>
+                <a:latin typeface="Arial"/>
+                <a:ea typeface="DejaVu Sans"/>
+              </a:rPr>
+              <a:t>In this course we will be focusing soly on AWS.</a:t>
             </a:r>
             <a:endParaRPr b="0" lang="en-CA" sz="1800" spc="-1" strike="noStrike">
               <a:latin typeface="Arial"/>
@@ -8742,7 +8809,7 @@
         <p:spPr>
           <a:xfrm>
             <a:off x="432000" y="13680"/>
-            <a:ext cx="7447680" cy="1179720"/>
+            <a:ext cx="7447320" cy="1179360"/>
           </a:xfrm>
           <a:prstGeom prst="rect">
             <a:avLst/>
@@ -8776,7 +8843,7 @@
                 <a:latin typeface="Nexa Bold"/>
                 <a:ea typeface="DejaVu Sans"/>
               </a:rPr>
-              <a:t>FINAL PRoject</a:t>
+              <a:t>Cloud Computing</a:t>
             </a:r>
             <a:endParaRPr b="0" lang="en-CA" sz="3000" spc="-1" strike="noStrike">
               <a:latin typeface="Arial"/>
@@ -8803,7 +8870,7 @@
         <p:spPr>
           <a:xfrm>
             <a:off x="0" y="0"/>
-            <a:ext cx="246960" cy="1191960"/>
+            <a:ext cx="246600" cy="1191600"/>
           </a:xfrm>
           <a:prstGeom prst="rect">
             <a:avLst/>
@@ -8873,7 +8940,7 @@
         <p:spPr>
           <a:xfrm>
             <a:off x="457200" y="273600"/>
-            <a:ext cx="8226000" cy="5304600"/>
+            <a:ext cx="8225640" cy="5304240"/>
           </a:xfrm>
           <a:prstGeom prst="rect">
             <a:avLst/>
@@ -8921,8 +8988,8 @@
         </p:nvSpPr>
         <p:spPr>
           <a:xfrm>
-            <a:off x="576000" y="1692000"/>
-            <a:ext cx="6764760" cy="2390760"/>
+            <a:off x="576000" y="1728000"/>
+            <a:ext cx="6764400" cy="2390400"/>
           </a:xfrm>
           <a:prstGeom prst="rect">
             <a:avLst/>
@@ -8954,8 +9021,18 @@
                 <a:latin typeface="Arial"/>
                 <a:ea typeface="DejaVu Sans"/>
               </a:rPr>
-              <a:t>Testing Out Our Knowledge</a:t>
-            </a:r>
+              <a:t>Resources</a:t>
+            </a:r>
+            <a:endParaRPr b="0" lang="en-CA" sz="1800" spc="-1" strike="noStrike">
+              <a:latin typeface="Arial"/>
+            </a:endParaRPr>
+          </a:p>
+          <a:p>
+            <a:pPr>
+              <a:lnSpc>
+                <a:spcPct val="100000"/>
+              </a:lnSpc>
+            </a:pPr>
             <a:endParaRPr b="0" lang="en-CA" sz="1800" spc="-1" strike="noStrike">
               <a:latin typeface="Arial"/>
             </a:endParaRPr>
@@ -8968,434 +9045,148 @@
             </a:pPr>
             <a:r>
               <a:rPr b="0" lang="en-CA" sz="1800" spc="-1" strike="noStrike">
-                <a:solidFill>
-                  <a:srgbClr val="000000"/>
-                </a:solidFill>
-                <a:latin typeface="Arial"/>
-                <a:ea typeface="DejaVu Sans"/>
-              </a:rPr>
-              <a:t>Now that we have a solid understanding of DevOps we are going to take our knowledge and put it into practice.</a:t>
-            </a:r>
-            <a:endParaRPr b="0" lang="en-CA" sz="1800" spc="-1" strike="noStrike">
-              <a:latin typeface="Arial"/>
-            </a:endParaRPr>
-          </a:p>
-          <a:p>
-            <a:pPr>
-              <a:lnSpc>
-                <a:spcPct val="100000"/>
-              </a:lnSpc>
-            </a:pPr>
-            <a:endParaRPr b="0" lang="en-CA" sz="1800" spc="-1" strike="noStrike">
-              <a:latin typeface="Arial"/>
-            </a:endParaRPr>
-          </a:p>
-          <a:p>
-            <a:pPr>
-              <a:lnSpc>
-                <a:spcPct val="100000"/>
-              </a:lnSpc>
-            </a:pPr>
-            <a:r>
-              <a:rPr b="1" lang="en-CA" sz="1800" spc="-1" strike="noStrike">
-                <a:solidFill>
-                  <a:srgbClr val="000000"/>
-                </a:solidFill>
-                <a:latin typeface="Arial"/>
-                <a:ea typeface="DejaVu Sans"/>
-              </a:rPr>
-              <a:t>The Assignment</a:t>
-            </a:r>
-            <a:endParaRPr b="0" lang="en-CA" sz="1800" spc="-1" strike="noStrike">
-              <a:latin typeface="Arial"/>
-            </a:endParaRPr>
-          </a:p>
-          <a:p>
-            <a:pPr>
-              <a:lnSpc>
-                <a:spcPct val="100000"/>
-              </a:lnSpc>
-            </a:pPr>
-            <a:r>
-              <a:rPr b="0" lang="en-CA" sz="1800" spc="-1" strike="noStrike">
-                <a:solidFill>
-                  <a:srgbClr val="000000"/>
-                </a:solidFill>
-                <a:latin typeface="Arial"/>
-                <a:ea typeface="DejaVu Sans"/>
-              </a:rPr>
-              <a:t>1) </a:t>
-            </a:r>
-            <a:r>
-              <a:rPr b="0" lang="en-CA" sz="1800" spc="-1" strike="noStrike">
-                <a:solidFill>
-                  <a:srgbClr val="000000"/>
-                </a:solidFill>
-                <a:latin typeface="Arial"/>
-                <a:ea typeface="DejaVu Sans"/>
-              </a:rPr>
-              <a:t>	</a:t>
-            </a:r>
-            <a:r>
-              <a:rPr b="0" lang="en-CA" sz="1800" spc="-1" strike="noStrike">
-                <a:solidFill>
-                  <a:srgbClr val="000000"/>
-                </a:solidFill>
-                <a:latin typeface="Arial"/>
-                <a:ea typeface="DejaVu Sans"/>
-              </a:rPr>
-              <a:t>Configure another Ubuntu 19.04 virtual machine</a:t>
-            </a:r>
-            <a:endParaRPr b="0" lang="en-CA" sz="1800" spc="-1" strike="noStrike">
-              <a:latin typeface="Arial"/>
-            </a:endParaRPr>
-          </a:p>
-          <a:p>
-            <a:pPr>
-              <a:lnSpc>
-                <a:spcPct val="100000"/>
-              </a:lnSpc>
-            </a:pPr>
-            <a:r>
-              <a:rPr b="0" lang="en-CA" sz="1800" spc="-1" strike="noStrike">
-                <a:solidFill>
-                  <a:srgbClr val="000000"/>
-                </a:solidFill>
-                <a:latin typeface="Arial"/>
-                <a:ea typeface="DejaVu Sans"/>
-              </a:rPr>
-              <a:t>2)</a:t>
-            </a:r>
-            <a:r>
-              <a:rPr b="0" lang="en-CA" sz="1800" spc="-1" strike="noStrike">
-                <a:solidFill>
-                  <a:srgbClr val="000000"/>
-                </a:solidFill>
-                <a:latin typeface="Arial"/>
-                <a:ea typeface="DejaVu Sans"/>
-              </a:rPr>
-              <a:t>	</a:t>
-            </a:r>
-            <a:r>
-              <a:rPr b="0" lang="en-CA" sz="1800" spc="-1" strike="noStrike">
-                <a:solidFill>
-                  <a:srgbClr val="000000"/>
-                </a:solidFill>
-                <a:latin typeface="Arial"/>
-                <a:ea typeface="DejaVu Sans"/>
-              </a:rPr>
-              <a:t>Install our tools (docker / python / git / jenkins) on that </a:t>
-            </a:r>
-            <a:r>
-              <a:rPr b="0" lang="en-CA" sz="1800" spc="-1" strike="noStrike">
-                <a:solidFill>
-                  <a:srgbClr val="000000"/>
-                </a:solidFill>
-                <a:latin typeface="Arial"/>
-                <a:ea typeface="DejaVu Sans"/>
-              </a:rPr>
-              <a:t>	</a:t>
-            </a:r>
-            <a:r>
-              <a:rPr b="0" lang="en-CA" sz="1800" spc="-1" strike="noStrike">
-                <a:solidFill>
-                  <a:srgbClr val="000000"/>
-                </a:solidFill>
-                <a:latin typeface="Arial"/>
-                <a:ea typeface="DejaVu Sans"/>
-              </a:rPr>
-              <a:t>	</a:t>
-            </a:r>
-            <a:r>
-              <a:rPr b="0" lang="en-CA" sz="1800" spc="-1" strike="noStrike">
-                <a:solidFill>
-                  <a:srgbClr val="000000"/>
-                </a:solidFill>
-                <a:latin typeface="Arial"/>
-                <a:ea typeface="DejaVu Sans"/>
-              </a:rPr>
-              <a:t>machine</a:t>
-            </a:r>
-            <a:endParaRPr b="0" lang="en-CA" sz="1800" spc="-1" strike="noStrike">
-              <a:latin typeface="Arial"/>
-            </a:endParaRPr>
-          </a:p>
-          <a:p>
-            <a:pPr>
-              <a:lnSpc>
-                <a:spcPct val="100000"/>
-              </a:lnSpc>
-            </a:pPr>
-            <a:r>
-              <a:rPr b="0" lang="en-CA" sz="1800" spc="-1" strike="noStrike">
-                <a:solidFill>
-                  <a:srgbClr val="000000"/>
-                </a:solidFill>
-                <a:latin typeface="Arial"/>
-                <a:ea typeface="DejaVu Sans"/>
-              </a:rPr>
-              <a:t>3)</a:t>
-            </a:r>
-            <a:r>
-              <a:rPr b="0" lang="en-CA" sz="1800" spc="-1" strike="noStrike">
-                <a:solidFill>
-                  <a:srgbClr val="000000"/>
-                </a:solidFill>
-                <a:latin typeface="Arial"/>
-                <a:ea typeface="DejaVu Sans"/>
-              </a:rPr>
-              <a:t>	</a:t>
-            </a:r>
-            <a:r>
-              <a:rPr b="0" lang="en-CA" sz="1800" spc="-1" strike="noStrike">
-                <a:solidFill>
-                  <a:srgbClr val="000000"/>
-                </a:solidFill>
-                <a:latin typeface="Arial"/>
-                <a:ea typeface="DejaVu Sans"/>
-              </a:rPr>
-              <a:t>Setup Jenkins to run in a container on that VM</a:t>
-            </a:r>
-            <a:endParaRPr b="0" lang="en-CA" sz="1800" spc="-1" strike="noStrike">
-              <a:latin typeface="Arial"/>
-            </a:endParaRPr>
-          </a:p>
-          <a:p>
-            <a:pPr>
-              <a:lnSpc>
-                <a:spcPct val="100000"/>
-              </a:lnSpc>
-            </a:pPr>
-            <a:r>
-              <a:rPr b="0" lang="en-CA" sz="1800" spc="-1" strike="noStrike">
-                <a:solidFill>
-                  <a:srgbClr val="000000"/>
-                </a:solidFill>
-                <a:latin typeface="Arial"/>
-                <a:ea typeface="DejaVu Sans"/>
-              </a:rPr>
-              <a:t>4)</a:t>
-            </a:r>
-            <a:r>
-              <a:rPr b="0" lang="en-CA" sz="1800" spc="-1" strike="noStrike">
-                <a:solidFill>
-                  <a:srgbClr val="000000"/>
-                </a:solidFill>
-                <a:latin typeface="Arial"/>
-                <a:ea typeface="DejaVu Sans"/>
-              </a:rPr>
-              <a:t>	</a:t>
-            </a:r>
-            <a:r>
-              <a:rPr b="0" lang="en-CA" sz="1800" spc="-1" strike="noStrike">
-                <a:solidFill>
-                  <a:srgbClr val="000000"/>
-                </a:solidFill>
-                <a:latin typeface="Arial"/>
-                <a:ea typeface="DejaVu Sans"/>
-              </a:rPr>
-              <a:t>Use Ansible to create an EC2 instance on AWS</a:t>
-            </a:r>
-            <a:endParaRPr b="0" lang="en-CA" sz="1800" spc="-1" strike="noStrike">
-              <a:latin typeface="Arial"/>
-            </a:endParaRPr>
-          </a:p>
-          <a:p>
-            <a:pPr>
-              <a:lnSpc>
-                <a:spcPct val="100000"/>
-              </a:lnSpc>
-            </a:pPr>
-            <a:r>
-              <a:rPr b="0" lang="en-CA" sz="1800" spc="-1" strike="noStrike">
-                <a:solidFill>
-                  <a:srgbClr val="000000"/>
-                </a:solidFill>
-                <a:latin typeface="Arial"/>
-                <a:ea typeface="DejaVu Sans"/>
-              </a:rPr>
-              <a:t>5)</a:t>
-            </a:r>
-            <a:r>
-              <a:rPr b="0" lang="en-CA" sz="1800" spc="-1" strike="noStrike">
-                <a:solidFill>
-                  <a:srgbClr val="000000"/>
-                </a:solidFill>
-                <a:latin typeface="Arial"/>
-                <a:ea typeface="DejaVu Sans"/>
-              </a:rPr>
-              <a:t>	</a:t>
-            </a:r>
-            <a:r>
-              <a:rPr b="0" lang="en-CA" sz="1800" spc="-1" strike="noStrike">
-                <a:solidFill>
-                  <a:srgbClr val="000000"/>
-                </a:solidFill>
-                <a:latin typeface="Arial"/>
-                <a:ea typeface="DejaVu Sans"/>
-              </a:rPr>
-              <a:t>Create an application directory for our python application</a:t>
-            </a:r>
-            <a:endParaRPr b="0" lang="en-CA" sz="1800" spc="-1" strike="noStrike">
-              <a:latin typeface="Arial"/>
-            </a:endParaRPr>
-          </a:p>
-          <a:p>
-            <a:pPr>
-              <a:lnSpc>
-                <a:spcPct val="100000"/>
-              </a:lnSpc>
-            </a:pPr>
-            <a:r>
-              <a:rPr b="0" lang="en-CA" sz="1800" spc="-1" strike="noStrike">
-                <a:solidFill>
-                  <a:srgbClr val="000000"/>
-                </a:solidFill>
-                <a:latin typeface="Arial"/>
-                <a:ea typeface="DejaVu Sans"/>
-              </a:rPr>
-              <a:t>6)</a:t>
-            </a:r>
-            <a:r>
-              <a:rPr b="0" lang="en-CA" sz="1800" spc="-1" strike="noStrike">
-                <a:solidFill>
-                  <a:srgbClr val="000000"/>
-                </a:solidFill>
-                <a:latin typeface="Arial"/>
-                <a:ea typeface="DejaVu Sans"/>
-              </a:rPr>
-              <a:t>	</a:t>
-            </a:r>
-            <a:r>
-              <a:rPr b="0" lang="en-CA" sz="1800" spc="-1" strike="noStrike">
-                <a:solidFill>
-                  <a:srgbClr val="000000"/>
-                </a:solidFill>
-                <a:latin typeface="Arial"/>
-                <a:ea typeface="DejaVu Sans"/>
-              </a:rPr>
-              <a:t>Put our python directory under version control</a:t>
-            </a:r>
-            <a:endParaRPr b="0" lang="en-CA" sz="1800" spc="-1" strike="noStrike">
-              <a:latin typeface="Arial"/>
-            </a:endParaRPr>
-          </a:p>
-          <a:p>
-            <a:pPr>
-              <a:lnSpc>
-                <a:spcPct val="100000"/>
-              </a:lnSpc>
-            </a:pPr>
-            <a:r>
-              <a:rPr b="0" lang="en-CA" sz="1800" spc="-1" strike="noStrike">
-                <a:solidFill>
-                  <a:srgbClr val="000000"/>
-                </a:solidFill>
-                <a:latin typeface="Arial"/>
-                <a:ea typeface="DejaVu Sans"/>
-              </a:rPr>
-              <a:t>7)</a:t>
-            </a:r>
-            <a:r>
-              <a:rPr b="0" lang="en-CA" sz="1800" spc="-1" strike="noStrike">
-                <a:solidFill>
-                  <a:srgbClr val="000000"/>
-                </a:solidFill>
-                <a:latin typeface="Arial"/>
-                <a:ea typeface="DejaVu Sans"/>
-              </a:rPr>
-              <a:t>	</a:t>
-            </a:r>
-            <a:r>
-              <a:rPr b="0" lang="en-CA" sz="1800" spc="-1" strike="noStrike">
-                <a:solidFill>
-                  <a:srgbClr val="000000"/>
-                </a:solidFill>
-                <a:latin typeface="Arial"/>
-                <a:ea typeface="DejaVu Sans"/>
-              </a:rPr>
-              <a:t>Configure python to push that application up to the EC2 </a:t>
-            </a:r>
-            <a:r>
-              <a:rPr b="0" lang="en-CA" sz="1800" spc="-1" strike="noStrike">
-                <a:solidFill>
-                  <a:srgbClr val="000000"/>
-                </a:solidFill>
-                <a:latin typeface="Arial"/>
-                <a:ea typeface="DejaVu Sans"/>
-              </a:rPr>
-              <a:t>	</a:t>
-            </a:r>
-            <a:endParaRPr b="0" lang="en-CA" sz="1800" spc="-1" strike="noStrike">
-              <a:latin typeface="Arial"/>
-            </a:endParaRPr>
-          </a:p>
-          <a:p>
-            <a:pPr>
-              <a:lnSpc>
-                <a:spcPct val="100000"/>
-              </a:lnSpc>
-            </a:pPr>
-            <a:r>
-              <a:rPr b="0" lang="en-CA" sz="1800" spc="-1" strike="noStrike">
-                <a:solidFill>
-                  <a:srgbClr val="000000"/>
-                </a:solidFill>
-                <a:latin typeface="Arial"/>
-                <a:ea typeface="DejaVu Sans"/>
-              </a:rPr>
-              <a:t>	</a:t>
-            </a:r>
-            <a:r>
-              <a:rPr b="0" lang="en-CA" sz="1800" spc="-1" strike="noStrike">
-                <a:solidFill>
-                  <a:srgbClr val="000000"/>
-                </a:solidFill>
-                <a:latin typeface="Arial"/>
-                <a:ea typeface="DejaVu Sans"/>
-              </a:rPr>
-              <a:t>instance on AWS.</a:t>
-            </a:r>
-            <a:endParaRPr b="0" lang="en-CA" sz="1800" spc="-1" strike="noStrike">
-              <a:latin typeface="Arial"/>
-            </a:endParaRPr>
-          </a:p>
-          <a:p>
-            <a:pPr>
-              <a:lnSpc>
-                <a:spcPct val="100000"/>
-              </a:lnSpc>
-            </a:pPr>
-            <a:r>
-              <a:rPr b="0" lang="en-CA" sz="1800" spc="-1" strike="noStrike">
-                <a:solidFill>
-                  <a:srgbClr val="000000"/>
-                </a:solidFill>
-                <a:latin typeface="Arial"/>
-                <a:ea typeface="DejaVu Sans"/>
-              </a:rPr>
-              <a:t>8) </a:t>
-            </a:r>
-            <a:r>
-              <a:rPr b="0" lang="en-CA" sz="1800" spc="-1" strike="noStrike">
-                <a:solidFill>
-                  <a:srgbClr val="000000"/>
-                </a:solidFill>
-                <a:latin typeface="Arial"/>
-                <a:ea typeface="DejaVu Sans"/>
-              </a:rPr>
-              <a:t>	</a:t>
-            </a:r>
-            <a:r>
-              <a:rPr b="0" lang="en-CA" sz="1800" spc="-1" strike="noStrike">
-                <a:solidFill>
-                  <a:srgbClr val="000000"/>
-                </a:solidFill>
-                <a:latin typeface="Arial"/>
-                <a:ea typeface="DejaVu Sans"/>
-              </a:rPr>
-              <a:t>Verify our application is working on our EC2 Instance.</a:t>
-            </a:r>
+                <a:latin typeface="Arial"/>
+              </a:rPr>
+              <a:t>Look at these videos and come to class prepared to talk about them:</a:t>
+            </a:r>
+            <a:endParaRPr b="0" lang="en-CA" sz="1800" spc="-1" strike="noStrike">
+              <a:latin typeface="Arial"/>
+            </a:endParaRPr>
+          </a:p>
+          <a:p>
+            <a:pPr>
+              <a:lnSpc>
+                <a:spcPct val="100000"/>
+              </a:lnSpc>
+            </a:pPr>
+            <a:endParaRPr b="0" lang="en-CA" sz="1800" spc="-1" strike="noStrike">
+              <a:latin typeface="Arial"/>
+            </a:endParaRPr>
+          </a:p>
+          <a:p>
+            <a:pPr>
+              <a:lnSpc>
+                <a:spcPct val="100000"/>
+              </a:lnSpc>
+            </a:pPr>
+            <a:r>
+              <a:rPr b="0" lang="en-CA" sz="1800" spc="-1" strike="noStrike" u="sng">
+                <a:solidFill>
+                  <a:srgbClr val="0000ff"/>
+                </a:solidFill>
+                <a:uFillTx/>
+                <a:latin typeface="Arial"/>
+                <a:ea typeface="DejaVu Sans"/>
+                <a:hlinkClick r:id="rId1"/>
+              </a:rPr>
+              <a:t>https://www.youtube.com/watch?v=RWgW-CgdIk0</a:t>
+            </a:r>
+            <a:endParaRPr b="0" lang="en-CA" sz="1800" spc="-1" strike="noStrike">
+              <a:latin typeface="Arial"/>
+            </a:endParaRPr>
+          </a:p>
+          <a:p>
+            <a:pPr>
+              <a:lnSpc>
+                <a:spcPct val="100000"/>
+              </a:lnSpc>
+            </a:pPr>
+            <a:endParaRPr b="0" lang="en-CA" sz="1800" spc="-1" strike="noStrike">
+              <a:latin typeface="Arial"/>
+            </a:endParaRPr>
+          </a:p>
+          <a:p>
+            <a:pPr>
+              <a:lnSpc>
+                <a:spcPct val="100000"/>
+              </a:lnSpc>
+            </a:pPr>
+            <a:r>
+              <a:rPr b="0" lang="en-CA" sz="1800" spc="-1" strike="noStrike" u="sng">
+                <a:solidFill>
+                  <a:srgbClr val="0000ff"/>
+                </a:solidFill>
+                <a:uFillTx/>
+                <a:latin typeface="Arial"/>
+                <a:ea typeface="DejaVu Sans"/>
+                <a:hlinkClick r:id="rId2"/>
+              </a:rPr>
+              <a:t>https://www.youtube.com/watch?v=m0a2CzgLNsc</a:t>
+            </a:r>
+            <a:endParaRPr b="0" lang="en-CA" sz="1800" spc="-1" strike="noStrike">
+              <a:latin typeface="Arial"/>
+            </a:endParaRPr>
+          </a:p>
+          <a:p>
+            <a:pPr>
+              <a:lnSpc>
+                <a:spcPct val="100000"/>
+              </a:lnSpc>
+            </a:pPr>
+            <a:endParaRPr b="0" lang="en-CA" sz="1800" spc="-1" strike="noStrike">
+              <a:latin typeface="Arial"/>
+            </a:endParaRPr>
+          </a:p>
+          <a:p>
+            <a:pPr>
+              <a:lnSpc>
+                <a:spcPct val="100000"/>
+              </a:lnSpc>
+            </a:pPr>
+            <a:r>
+              <a:rPr b="0" lang="en-CA" sz="1800" spc="-1" strike="noStrike" u="sng">
+                <a:solidFill>
+                  <a:srgbClr val="0000ff"/>
+                </a:solidFill>
+                <a:uFillTx/>
+                <a:latin typeface="Arial"/>
+                <a:ea typeface="DejaVu Sans"/>
+                <a:hlinkClick r:id="rId3"/>
+              </a:rPr>
+              <a:t>https://www.youtube.com/watch?v=LFkGtg-ZTko</a:t>
+            </a:r>
+            <a:endParaRPr b="0" lang="en-CA" sz="1800" spc="-1" strike="noStrike">
+              <a:latin typeface="Arial"/>
+            </a:endParaRPr>
+          </a:p>
+          <a:p>
+            <a:pPr>
+              <a:lnSpc>
+                <a:spcPct val="100000"/>
+              </a:lnSpc>
+            </a:pPr>
+            <a:endParaRPr b="0" lang="en-CA" sz="1800" spc="-1" strike="noStrike">
+              <a:latin typeface="Arial"/>
+            </a:endParaRPr>
+          </a:p>
+          <a:p>
+            <a:pPr>
+              <a:lnSpc>
+                <a:spcPct val="100000"/>
+              </a:lnSpc>
+            </a:pPr>
+            <a:r>
+              <a:rPr b="0" lang="en-CA" sz="1800" spc="-1" strike="noStrike" u="sng">
+                <a:solidFill>
+                  <a:srgbClr val="0000ff"/>
+                </a:solidFill>
+                <a:uFillTx/>
+                <a:latin typeface="Arial"/>
+                <a:ea typeface="DejaVu Sans"/>
+                <a:hlinkClick r:id="rId4"/>
+              </a:rPr>
+              <a:t>https://www.youtube.com/results?search_query=aws+tutorial+for+beginners</a:t>
+            </a:r>
+            <a:endParaRPr b="0" lang="en-CA" sz="1800" spc="-1" strike="noStrike">
+              <a:latin typeface="Arial"/>
+            </a:endParaRPr>
+          </a:p>
+          <a:p>
+            <a:pPr>
+              <a:lnSpc>
+                <a:spcPct val="100000"/>
+              </a:lnSpc>
+            </a:pPr>
             <a:endParaRPr b="0" lang="en-CA" sz="1800" spc="-1" strike="noStrike">
               <a:latin typeface="Arial"/>
             </a:endParaRPr>
@@ -9466,8 +9257,8 @@
         </p:nvSpPr>
         <p:spPr>
           <a:xfrm>
-            <a:off x="432000" y="0"/>
-            <a:ext cx="7447680" cy="1179720"/>
+            <a:off x="432000" y="13680"/>
+            <a:ext cx="7447320" cy="1179360"/>
           </a:xfrm>
           <a:prstGeom prst="rect">
             <a:avLst/>
@@ -9494,25 +9285,25 @@
               </a:lnSpc>
             </a:pPr>
             <a:r>
-              <a:rPr b="0" lang="en-CA" sz="3000" spc="-1" strike="noStrike">
+              <a:rPr b="0" lang="en-CA" sz="3000" spc="-1" strike="noStrike" cap="all">
                 <a:solidFill>
                   <a:srgbClr val="292929"/>
                 </a:solidFill>
                 <a:latin typeface="Nexa Bold"/>
                 <a:ea typeface="DejaVu Sans"/>
               </a:rPr>
-              <a:t>THE </a:t>
-            </a:r>
-            <a:r>
-              <a:rPr b="0" lang="en-CA" sz="3000" spc="-1" strike="noStrike">
-                <a:solidFill>
-                  <a:srgbClr val="1fa0be"/>
-                </a:solidFill>
-                <a:latin typeface="Nexa Bold"/>
-                <a:ea typeface="DejaVu Sans"/>
-              </a:rPr>
-              <a:t>END</a:t>
-            </a:r>
+              <a:t>FINAL PRoject</a:t>
+            </a:r>
+            <a:endParaRPr b="0" lang="en-CA" sz="3000" spc="-1" strike="noStrike">
+              <a:latin typeface="Arial"/>
+            </a:endParaRPr>
+          </a:p>
+          <a:p>
+            <a:pPr>
+              <a:lnSpc>
+                <a:spcPct val="100000"/>
+              </a:lnSpc>
+            </a:pPr>
             <a:endParaRPr b="0" lang="en-CA" sz="3000" spc="-1" strike="noStrike">
               <a:latin typeface="Arial"/>
             </a:endParaRPr>
@@ -9528,7 +9319,7 @@
         <p:spPr>
           <a:xfrm>
             <a:off x="0" y="0"/>
-            <a:ext cx="246960" cy="1191960"/>
+            <a:ext cx="246600" cy="1191600"/>
           </a:xfrm>
           <a:prstGeom prst="rect">
             <a:avLst/>
@@ -9597,8 +9388,8 @@
         </p:nvSpPr>
         <p:spPr>
           <a:xfrm>
-            <a:off x="432000" y="1340640"/>
-            <a:ext cx="8275320" cy="5215320"/>
+            <a:off x="457200" y="273600"/>
+            <a:ext cx="8225640" cy="5304240"/>
           </a:xfrm>
           <a:prstGeom prst="rect">
             <a:avLst/>
@@ -9615,29 +9406,513 @@
           <a:fontRef idx="minor"/>
         </p:style>
         <p:txBody>
-          <a:bodyPr lIns="90000" rIns="90000" tIns="45000" bIns="45000" anchor="ctr">
-            <a:normAutofit/>
-          </a:bodyPr>
+          <a:bodyPr lIns="0" rIns="0" tIns="0" bIns="0" anchor="ctr"/>
           <a:p>
             <a:pPr algn="ctr">
               <a:lnSpc>
                 <a:spcPct val="100000"/>
               </a:lnSpc>
-              <a:spcBef>
-                <a:spcPts val="921"/>
-              </a:spcBef>
-            </a:pPr>
-            <a:r>
-              <a:rPr b="1" lang="en-CA" sz="4600" spc="-1" strike="noStrike">
-                <a:solidFill>
-                  <a:srgbClr val="146e83"/>
-                </a:solidFill>
-                <a:latin typeface="Calibri"/>
-                <a:ea typeface="DejaVu Sans"/>
-              </a:rPr>
-              <a:t>QUESTIONS?</a:t>
-            </a:r>
-            <a:endParaRPr b="0" lang="en-CA" sz="4600" spc="-1" strike="noStrike">
+            </a:pPr>
+            <a:endParaRPr b="0" lang="en-CA" sz="1800" spc="-1" strike="noStrike">
+              <a:latin typeface="Arial"/>
+            </a:endParaRPr>
+          </a:p>
+          <a:p>
+            <a:pPr algn="ctr">
+              <a:lnSpc>
+                <a:spcPct val="100000"/>
+              </a:lnSpc>
+            </a:pPr>
+            <a:endParaRPr b="0" lang="en-CA" sz="1800" spc="-1" strike="noStrike">
+              <a:latin typeface="Arial"/>
+            </a:endParaRPr>
+          </a:p>
+        </p:txBody>
+      </p:sp>
+      <p:sp>
+        <p:nvSpPr>
+          <p:cNvPr id="204" name="CustomShape 5"/>
+          <p:cNvSpPr/>
+          <p:nvPr/>
+        </p:nvSpPr>
+        <p:spPr>
+          <a:xfrm>
+            <a:off x="576000" y="1692000"/>
+            <a:ext cx="6764400" cy="2390400"/>
+          </a:xfrm>
+          <a:prstGeom prst="rect">
+            <a:avLst/>
+          </a:prstGeom>
+          <a:noFill/>
+          <a:ln>
+            <a:noFill/>
+          </a:ln>
+        </p:spPr>
+        <p:style>
+          <a:lnRef idx="0"/>
+          <a:fillRef idx="0"/>
+          <a:effectRef idx="0"/>
+          <a:fontRef idx="minor"/>
+        </p:style>
+        <p:txBody>
+          <a:bodyPr lIns="90000" rIns="90000" tIns="45000" bIns="45000"/>
+          <a:p>
+            <a:pPr>
+              <a:lnSpc>
+                <a:spcPct val="100000"/>
+              </a:lnSpc>
+            </a:pPr>
+            <a:r>
+              <a:rPr b="1" lang="en-CA" sz="1800" spc="-1" strike="noStrike">
+                <a:solidFill>
+                  <a:srgbClr val="000000"/>
+                </a:solidFill>
+                <a:latin typeface="Arial"/>
+                <a:ea typeface="DejaVu Sans"/>
+              </a:rPr>
+              <a:t>Testing Out Our Knowledge</a:t>
+            </a:r>
+            <a:endParaRPr b="0" lang="en-CA" sz="1800" spc="-1" strike="noStrike">
+              <a:latin typeface="Arial"/>
+            </a:endParaRPr>
+          </a:p>
+          <a:p>
+            <a:pPr>
+              <a:lnSpc>
+                <a:spcPct val="100000"/>
+              </a:lnSpc>
+            </a:pPr>
+            <a:r>
+              <a:rPr b="0" lang="en-CA" sz="1800" spc="-1" strike="noStrike">
+                <a:solidFill>
+                  <a:srgbClr val="000000"/>
+                </a:solidFill>
+                <a:latin typeface="Arial"/>
+                <a:ea typeface="DejaVu Sans"/>
+              </a:rPr>
+              <a:t>Now that we have a solid understanding of DevOps we are going to take our knowledge and put it into practice.</a:t>
+            </a:r>
+            <a:endParaRPr b="0" lang="en-CA" sz="1800" spc="-1" strike="noStrike">
+              <a:latin typeface="Arial"/>
+            </a:endParaRPr>
+          </a:p>
+          <a:p>
+            <a:pPr>
+              <a:lnSpc>
+                <a:spcPct val="100000"/>
+              </a:lnSpc>
+            </a:pPr>
+            <a:endParaRPr b="0" lang="en-CA" sz="1800" spc="-1" strike="noStrike">
+              <a:latin typeface="Arial"/>
+            </a:endParaRPr>
+          </a:p>
+          <a:p>
+            <a:pPr>
+              <a:lnSpc>
+                <a:spcPct val="100000"/>
+              </a:lnSpc>
+            </a:pPr>
+            <a:r>
+              <a:rPr b="1" lang="en-CA" sz="1800" spc="-1" strike="noStrike">
+                <a:solidFill>
+                  <a:srgbClr val="000000"/>
+                </a:solidFill>
+                <a:latin typeface="Arial"/>
+                <a:ea typeface="DejaVu Sans"/>
+              </a:rPr>
+              <a:t>The Assignment</a:t>
+            </a:r>
+            <a:endParaRPr b="0" lang="en-CA" sz="1800" spc="-1" strike="noStrike">
+              <a:latin typeface="Arial"/>
+            </a:endParaRPr>
+          </a:p>
+          <a:p>
+            <a:pPr>
+              <a:lnSpc>
+                <a:spcPct val="100000"/>
+              </a:lnSpc>
+            </a:pPr>
+            <a:r>
+              <a:rPr b="0" lang="en-CA" sz="1800" spc="-1" strike="noStrike">
+                <a:solidFill>
+                  <a:srgbClr val="000000"/>
+                </a:solidFill>
+                <a:latin typeface="Arial"/>
+                <a:ea typeface="DejaVu Sans"/>
+              </a:rPr>
+              <a:t>1) </a:t>
+            </a:r>
+            <a:r>
+              <a:rPr b="0" lang="en-CA" sz="1800" spc="-1" strike="noStrike">
+                <a:solidFill>
+                  <a:srgbClr val="000000"/>
+                </a:solidFill>
+                <a:latin typeface="Arial"/>
+                <a:ea typeface="DejaVu Sans"/>
+              </a:rPr>
+              <a:t>	</a:t>
+            </a:r>
+            <a:r>
+              <a:rPr b="0" lang="en-CA" sz="1800" spc="-1" strike="noStrike">
+                <a:solidFill>
+                  <a:srgbClr val="000000"/>
+                </a:solidFill>
+                <a:latin typeface="Arial"/>
+                <a:ea typeface="DejaVu Sans"/>
+              </a:rPr>
+              <a:t>Configure another Ubuntu 19.04 virtual machine</a:t>
+            </a:r>
+            <a:endParaRPr b="0" lang="en-CA" sz="1800" spc="-1" strike="noStrike">
+              <a:latin typeface="Arial"/>
+            </a:endParaRPr>
+          </a:p>
+          <a:p>
+            <a:pPr>
+              <a:lnSpc>
+                <a:spcPct val="100000"/>
+              </a:lnSpc>
+            </a:pPr>
+            <a:r>
+              <a:rPr b="0" lang="en-CA" sz="1800" spc="-1" strike="noStrike">
+                <a:solidFill>
+                  <a:srgbClr val="000000"/>
+                </a:solidFill>
+                <a:latin typeface="Arial"/>
+                <a:ea typeface="DejaVu Sans"/>
+              </a:rPr>
+              <a:t>2)</a:t>
+            </a:r>
+            <a:r>
+              <a:rPr b="0" lang="en-CA" sz="1800" spc="-1" strike="noStrike">
+                <a:solidFill>
+                  <a:srgbClr val="000000"/>
+                </a:solidFill>
+                <a:latin typeface="Arial"/>
+                <a:ea typeface="DejaVu Sans"/>
+              </a:rPr>
+              <a:t>	</a:t>
+            </a:r>
+            <a:r>
+              <a:rPr b="0" lang="en-CA" sz="1800" spc="-1" strike="noStrike">
+                <a:solidFill>
+                  <a:srgbClr val="000000"/>
+                </a:solidFill>
+                <a:latin typeface="Arial"/>
+                <a:ea typeface="DejaVu Sans"/>
+              </a:rPr>
+              <a:t>Install our tools (docker / python / git / jenkins) on that </a:t>
+            </a:r>
+            <a:r>
+              <a:rPr b="0" lang="en-CA" sz="1800" spc="-1" strike="noStrike">
+                <a:solidFill>
+                  <a:srgbClr val="000000"/>
+                </a:solidFill>
+                <a:latin typeface="Arial"/>
+                <a:ea typeface="DejaVu Sans"/>
+              </a:rPr>
+              <a:t>	</a:t>
+            </a:r>
+            <a:r>
+              <a:rPr b="0" lang="en-CA" sz="1800" spc="-1" strike="noStrike">
+                <a:solidFill>
+                  <a:srgbClr val="000000"/>
+                </a:solidFill>
+                <a:latin typeface="Arial"/>
+                <a:ea typeface="DejaVu Sans"/>
+              </a:rPr>
+              <a:t>	</a:t>
+            </a:r>
+            <a:r>
+              <a:rPr b="0" lang="en-CA" sz="1800" spc="-1" strike="noStrike">
+                <a:solidFill>
+                  <a:srgbClr val="000000"/>
+                </a:solidFill>
+                <a:latin typeface="Arial"/>
+                <a:ea typeface="DejaVu Sans"/>
+              </a:rPr>
+              <a:t>machine</a:t>
+            </a:r>
+            <a:endParaRPr b="0" lang="en-CA" sz="1800" spc="-1" strike="noStrike">
+              <a:latin typeface="Arial"/>
+            </a:endParaRPr>
+          </a:p>
+          <a:p>
+            <a:pPr>
+              <a:lnSpc>
+                <a:spcPct val="100000"/>
+              </a:lnSpc>
+            </a:pPr>
+            <a:r>
+              <a:rPr b="0" lang="en-CA" sz="1800" spc="-1" strike="noStrike">
+                <a:solidFill>
+                  <a:srgbClr val="000000"/>
+                </a:solidFill>
+                <a:latin typeface="Arial"/>
+                <a:ea typeface="DejaVu Sans"/>
+              </a:rPr>
+              <a:t>3)</a:t>
+            </a:r>
+            <a:r>
+              <a:rPr b="0" lang="en-CA" sz="1800" spc="-1" strike="noStrike">
+                <a:solidFill>
+                  <a:srgbClr val="000000"/>
+                </a:solidFill>
+                <a:latin typeface="Arial"/>
+                <a:ea typeface="DejaVu Sans"/>
+              </a:rPr>
+              <a:t>	</a:t>
+            </a:r>
+            <a:r>
+              <a:rPr b="0" lang="en-CA" sz="1800" spc="-1" strike="noStrike">
+                <a:solidFill>
+                  <a:srgbClr val="000000"/>
+                </a:solidFill>
+                <a:latin typeface="Arial"/>
+                <a:ea typeface="DejaVu Sans"/>
+              </a:rPr>
+              <a:t>Setup Jenkins to run in a container on that VM</a:t>
+            </a:r>
+            <a:endParaRPr b="0" lang="en-CA" sz="1800" spc="-1" strike="noStrike">
+              <a:latin typeface="Arial"/>
+            </a:endParaRPr>
+          </a:p>
+          <a:p>
+            <a:pPr>
+              <a:lnSpc>
+                <a:spcPct val="100000"/>
+              </a:lnSpc>
+            </a:pPr>
+            <a:r>
+              <a:rPr b="0" lang="en-CA" sz="1800" spc="-1" strike="noStrike">
+                <a:solidFill>
+                  <a:srgbClr val="000000"/>
+                </a:solidFill>
+                <a:latin typeface="Arial"/>
+                <a:ea typeface="DejaVu Sans"/>
+              </a:rPr>
+              <a:t>4)</a:t>
+            </a:r>
+            <a:r>
+              <a:rPr b="0" lang="en-CA" sz="1800" spc="-1" strike="noStrike">
+                <a:solidFill>
+                  <a:srgbClr val="000000"/>
+                </a:solidFill>
+                <a:latin typeface="Arial"/>
+                <a:ea typeface="DejaVu Sans"/>
+              </a:rPr>
+              <a:t>	</a:t>
+            </a:r>
+            <a:r>
+              <a:rPr b="0" lang="en-CA" sz="1800" spc="-1" strike="noStrike">
+                <a:solidFill>
+                  <a:srgbClr val="000000"/>
+                </a:solidFill>
+                <a:latin typeface="Arial"/>
+                <a:ea typeface="DejaVu Sans"/>
+              </a:rPr>
+              <a:t>Use Ansible to create an EC2 instance on AWS</a:t>
+            </a:r>
+            <a:endParaRPr b="0" lang="en-CA" sz="1800" spc="-1" strike="noStrike">
+              <a:latin typeface="Arial"/>
+            </a:endParaRPr>
+          </a:p>
+          <a:p>
+            <a:pPr>
+              <a:lnSpc>
+                <a:spcPct val="100000"/>
+              </a:lnSpc>
+            </a:pPr>
+            <a:r>
+              <a:rPr b="0" lang="en-CA" sz="1800" spc="-1" strike="noStrike">
+                <a:solidFill>
+                  <a:srgbClr val="000000"/>
+                </a:solidFill>
+                <a:latin typeface="Arial"/>
+                <a:ea typeface="DejaVu Sans"/>
+              </a:rPr>
+              <a:t>5)</a:t>
+            </a:r>
+            <a:r>
+              <a:rPr b="0" lang="en-CA" sz="1800" spc="-1" strike="noStrike">
+                <a:solidFill>
+                  <a:srgbClr val="000000"/>
+                </a:solidFill>
+                <a:latin typeface="Arial"/>
+                <a:ea typeface="DejaVu Sans"/>
+              </a:rPr>
+              <a:t>	</a:t>
+            </a:r>
+            <a:r>
+              <a:rPr b="0" lang="en-CA" sz="1800" spc="-1" strike="noStrike">
+                <a:solidFill>
+                  <a:srgbClr val="000000"/>
+                </a:solidFill>
+                <a:latin typeface="Arial"/>
+                <a:ea typeface="DejaVu Sans"/>
+              </a:rPr>
+              <a:t>Create an application directory for our python application</a:t>
+            </a:r>
+            <a:endParaRPr b="0" lang="en-CA" sz="1800" spc="-1" strike="noStrike">
+              <a:latin typeface="Arial"/>
+            </a:endParaRPr>
+          </a:p>
+          <a:p>
+            <a:pPr>
+              <a:lnSpc>
+                <a:spcPct val="100000"/>
+              </a:lnSpc>
+            </a:pPr>
+            <a:r>
+              <a:rPr b="0" lang="en-CA" sz="1800" spc="-1" strike="noStrike">
+                <a:solidFill>
+                  <a:srgbClr val="000000"/>
+                </a:solidFill>
+                <a:latin typeface="Arial"/>
+                <a:ea typeface="DejaVu Sans"/>
+              </a:rPr>
+              <a:t>6)</a:t>
+            </a:r>
+            <a:r>
+              <a:rPr b="0" lang="en-CA" sz="1800" spc="-1" strike="noStrike">
+                <a:solidFill>
+                  <a:srgbClr val="000000"/>
+                </a:solidFill>
+                <a:latin typeface="Arial"/>
+                <a:ea typeface="DejaVu Sans"/>
+              </a:rPr>
+              <a:t>	</a:t>
+            </a:r>
+            <a:r>
+              <a:rPr b="0" lang="en-CA" sz="1800" spc="-1" strike="noStrike">
+                <a:solidFill>
+                  <a:srgbClr val="000000"/>
+                </a:solidFill>
+                <a:latin typeface="Arial"/>
+                <a:ea typeface="DejaVu Sans"/>
+              </a:rPr>
+              <a:t>Put our python directory under version control</a:t>
+            </a:r>
+            <a:endParaRPr b="0" lang="en-CA" sz="1800" spc="-1" strike="noStrike">
+              <a:latin typeface="Arial"/>
+            </a:endParaRPr>
+          </a:p>
+          <a:p>
+            <a:pPr>
+              <a:lnSpc>
+                <a:spcPct val="100000"/>
+              </a:lnSpc>
+            </a:pPr>
+            <a:r>
+              <a:rPr b="0" lang="en-CA" sz="1800" spc="-1" strike="noStrike">
+                <a:solidFill>
+                  <a:srgbClr val="000000"/>
+                </a:solidFill>
+                <a:latin typeface="Arial"/>
+                <a:ea typeface="DejaVu Sans"/>
+              </a:rPr>
+              <a:t>7)</a:t>
+            </a:r>
+            <a:r>
+              <a:rPr b="0" lang="en-CA" sz="1800" spc="-1" strike="noStrike">
+                <a:solidFill>
+                  <a:srgbClr val="000000"/>
+                </a:solidFill>
+                <a:latin typeface="Arial"/>
+                <a:ea typeface="DejaVu Sans"/>
+              </a:rPr>
+              <a:t>	</a:t>
+            </a:r>
+            <a:r>
+              <a:rPr b="0" lang="en-CA" sz="1800" spc="-1" strike="noStrike">
+                <a:solidFill>
+                  <a:srgbClr val="000000"/>
+                </a:solidFill>
+                <a:latin typeface="Arial"/>
+                <a:ea typeface="DejaVu Sans"/>
+              </a:rPr>
+              <a:t>Configure python to push that application up to the EC2</a:t>
+            </a:r>
+            <a:r>
+              <a:rPr b="0" lang="en-CA" sz="1800" spc="-1" strike="noStrike">
+                <a:solidFill>
+                  <a:srgbClr val="000000"/>
+                </a:solidFill>
+                <a:latin typeface="Arial"/>
+                <a:ea typeface="DejaVu Sans"/>
+              </a:rPr>
+              <a:t>	</a:t>
+            </a:r>
+            <a:endParaRPr b="0" lang="en-CA" sz="1800" spc="-1" strike="noStrike">
+              <a:latin typeface="Arial"/>
+            </a:endParaRPr>
+          </a:p>
+          <a:p>
+            <a:pPr>
+              <a:lnSpc>
+                <a:spcPct val="100000"/>
+              </a:lnSpc>
+            </a:pPr>
+            <a:r>
+              <a:rPr b="0" lang="en-CA" sz="1800" spc="-1" strike="noStrike">
+                <a:solidFill>
+                  <a:srgbClr val="000000"/>
+                </a:solidFill>
+                <a:latin typeface="Arial"/>
+                <a:ea typeface="DejaVu Sans"/>
+              </a:rPr>
+              <a:t>	</a:t>
+            </a:r>
+            <a:r>
+              <a:rPr b="0" lang="en-CA" sz="1800" spc="-1" strike="noStrike">
+                <a:solidFill>
+                  <a:srgbClr val="000000"/>
+                </a:solidFill>
+                <a:latin typeface="Arial"/>
+                <a:ea typeface="DejaVu Sans"/>
+              </a:rPr>
+              <a:t>instance on AWS.</a:t>
+            </a:r>
+            <a:endParaRPr b="0" lang="en-CA" sz="1800" spc="-1" strike="noStrike">
+              <a:latin typeface="Arial"/>
+            </a:endParaRPr>
+          </a:p>
+          <a:p>
+            <a:pPr>
+              <a:lnSpc>
+                <a:spcPct val="100000"/>
+              </a:lnSpc>
+            </a:pPr>
+            <a:r>
+              <a:rPr b="0" lang="en-CA" sz="1800" spc="-1" strike="noStrike">
+                <a:solidFill>
+                  <a:srgbClr val="000000"/>
+                </a:solidFill>
+                <a:latin typeface="Arial"/>
+                <a:ea typeface="DejaVu Sans"/>
+              </a:rPr>
+              <a:t>8) </a:t>
+            </a:r>
+            <a:r>
+              <a:rPr b="0" lang="en-CA" sz="1800" spc="-1" strike="noStrike">
+                <a:solidFill>
+                  <a:srgbClr val="000000"/>
+                </a:solidFill>
+                <a:latin typeface="Arial"/>
+                <a:ea typeface="DejaVu Sans"/>
+              </a:rPr>
+              <a:t>	</a:t>
+            </a:r>
+            <a:r>
+              <a:rPr b="0" lang="en-CA" sz="1800" spc="-1" strike="noStrike">
+                <a:solidFill>
+                  <a:srgbClr val="000000"/>
+                </a:solidFill>
+                <a:latin typeface="Arial"/>
+                <a:ea typeface="DejaVu Sans"/>
+              </a:rPr>
+              <a:t>Verify our application is working on our EC2 Instance.</a:t>
+            </a:r>
+            <a:endParaRPr b="0" lang="en-CA" sz="1800" spc="-1" strike="noStrike">
               <a:latin typeface="Arial"/>
             </a:endParaRPr>
           </a:p>
@@ -9652,6 +9927,247 @@
           <p:childTnLst>
             <p:seq>
               <p:cTn id="36" dur="indefinite" nodeType="mainSeq"/>
+              <p:prevCondLst>
+                <p:cond delay="0" evt="onPrev">
+                  <p:tgtEl>
+                    <p:sldTgt/>
+                  </p:tgtEl>
+                </p:cond>
+              </p:prevCondLst>
+              <p:nextCondLst>
+                <p:cond delay="0" evt="onNext">
+                  <p:tgtEl>
+                    <p:sldTgt/>
+                  </p:tgtEl>
+                </p:cond>
+              </p:nextCondLst>
+            </p:seq>
+          </p:childTnLst>
+        </p:cTn>
+      </p:par>
+    </p:tnLst>
+  </p:timing>
+</p:sld>
+</file>
+
+<file path=ppt/slides/slide19.xml><?xml version="1.0" encoding="utf-8"?>
+<p:sld xmlns:a="http://schemas.openxmlformats.org/drawingml/2006/main" xmlns:p="http://schemas.openxmlformats.org/presentationml/2006/main" xmlns:r="http://schemas.openxmlformats.org/officeDocument/2006/relationships" xmlns:p14="http://schemas.microsoft.com/office/powerpoint/2010/main" xmlns:p15="http://schemas.microsoft.com/office/powerpoint/2012/main" xmlns:mc="http://schemas.openxmlformats.org/markup-compatibility/2006">
+  <p:cSld>
+    <p:bg>
+      <p:bgPr>
+        <a:solidFill>
+          <a:srgbClr val="f2f2f2"/>
+        </a:solidFill>
+      </p:bgPr>
+    </p:bg>
+    <p:spTree>
+      <p:nvGrpSpPr>
+        <p:cNvPr id="1" name=""/>
+        <p:cNvGrpSpPr/>
+        <p:nvPr/>
+      </p:nvGrpSpPr>
+      <p:grpSpPr>
+        <a:xfrm>
+          <a:off x="0" y="0"/>
+          <a:ext cx="0" cy="0"/>
+          <a:chOff x="0" y="0"/>
+          <a:chExt cx="0" cy="0"/>
+        </a:xfrm>
+      </p:grpSpPr>
+      <p:sp>
+        <p:nvSpPr>
+          <p:cNvPr id="205" name="CustomShape 1"/>
+          <p:cNvSpPr/>
+          <p:nvPr/>
+        </p:nvSpPr>
+        <p:spPr>
+          <a:xfrm>
+            <a:off x="432000" y="0"/>
+            <a:ext cx="7447320" cy="1179360"/>
+          </a:xfrm>
+          <a:prstGeom prst="rect">
+            <a:avLst/>
+          </a:prstGeom>
+          <a:noFill/>
+          <a:ln>
+            <a:noFill/>
+          </a:ln>
+        </p:spPr>
+        <p:style>
+          <a:lnRef idx="0"/>
+          <a:fillRef idx="0"/>
+          <a:effectRef idx="0"/>
+          <a:fontRef idx="minor"/>
+        </p:style>
+        <p:txBody>
+          <a:bodyPr lIns="90000" rIns="90000" tIns="45000" bIns="45000" anchor="ctr">
+            <a:normAutofit/>
+          </a:bodyPr>
+          <a:p>
+            <a:pPr>
+              <a:lnSpc>
+                <a:spcPct val="100000"/>
+              </a:lnSpc>
+            </a:pPr>
+            <a:r>
+              <a:rPr b="0" lang="en-CA" sz="3000" spc="-1" strike="noStrike">
+                <a:solidFill>
+                  <a:srgbClr val="292929"/>
+                </a:solidFill>
+                <a:latin typeface="Nexa Bold"/>
+                <a:ea typeface="DejaVu Sans"/>
+              </a:rPr>
+              <a:t>THE </a:t>
+            </a:r>
+            <a:r>
+              <a:rPr b="0" lang="en-CA" sz="3000" spc="-1" strike="noStrike">
+                <a:solidFill>
+                  <a:srgbClr val="1fa0be"/>
+                </a:solidFill>
+                <a:latin typeface="Nexa Bold"/>
+                <a:ea typeface="DejaVu Sans"/>
+              </a:rPr>
+              <a:t>END</a:t>
+            </a:r>
+            <a:endParaRPr b="0" lang="en-CA" sz="3000" spc="-1" strike="noStrike">
+              <a:latin typeface="Arial"/>
+            </a:endParaRPr>
+          </a:p>
+        </p:txBody>
+      </p:sp>
+      <p:sp>
+        <p:nvSpPr>
+          <p:cNvPr id="206" name="CustomShape 2"/>
+          <p:cNvSpPr/>
+          <p:nvPr/>
+        </p:nvSpPr>
+        <p:spPr>
+          <a:xfrm>
+            <a:off x="0" y="0"/>
+            <a:ext cx="246600" cy="1191600"/>
+          </a:xfrm>
+          <a:prstGeom prst="rect">
+            <a:avLst/>
+          </a:prstGeom>
+          <a:solidFill>
+            <a:srgbClr val="146e83"/>
+          </a:solidFill>
+          <a:ln>
+            <a:round/>
+          </a:ln>
+        </p:spPr>
+        <p:style>
+          <a:lnRef idx="2">
+            <a:schemeClr val="accent1">
+              <a:shade val="50000"/>
+            </a:schemeClr>
+          </a:lnRef>
+          <a:fillRef idx="1">
+            <a:schemeClr val="accent1"/>
+          </a:fillRef>
+          <a:effectRef idx="0">
+            <a:schemeClr val="accent1"/>
+          </a:effectRef>
+          <a:fontRef idx="minor"/>
+        </p:style>
+      </p:sp>
+      <p:sp>
+        <p:nvSpPr>
+          <p:cNvPr id="207" name="Line 3"/>
+          <p:cNvSpPr/>
+          <p:nvPr/>
+        </p:nvSpPr>
+        <p:spPr>
+          <a:xfrm>
+            <a:off x="251280" y="1196640"/>
+            <a:ext cx="8892720" cy="360"/>
+          </a:xfrm>
+          <a:prstGeom prst="line">
+            <a:avLst/>
+          </a:prstGeom>
+          <a:ln w="22320">
+            <a:solidFill>
+              <a:srgbClr val="146e83"/>
+            </a:solidFill>
+            <a:round/>
+          </a:ln>
+        </p:spPr>
+        <p:style>
+          <a:lnRef idx="1">
+            <a:schemeClr val="accent1"/>
+          </a:lnRef>
+          <a:fillRef idx="0">
+            <a:schemeClr val="accent1"/>
+          </a:fillRef>
+          <a:effectRef idx="0">
+            <a:schemeClr val="accent1"/>
+          </a:effectRef>
+          <a:fontRef idx="minor"/>
+        </p:style>
+      </p:sp>
+      <p:sp>
+        <p:nvSpPr>
+          <p:cNvPr id="208" name="CustomShape 4"/>
+          <p:cNvSpPr/>
+          <p:nvPr/>
+        </p:nvSpPr>
+        <p:spPr>
+          <a:xfrm>
+            <a:off x="432000" y="1340640"/>
+            <a:ext cx="8274960" cy="5214960"/>
+          </a:xfrm>
+          <a:prstGeom prst="rect">
+            <a:avLst/>
+          </a:prstGeom>
+          <a:noFill/>
+          <a:ln>
+            <a:noFill/>
+          </a:ln>
+        </p:spPr>
+        <p:style>
+          <a:lnRef idx="0"/>
+          <a:fillRef idx="0"/>
+          <a:effectRef idx="0"/>
+          <a:fontRef idx="minor"/>
+        </p:style>
+        <p:txBody>
+          <a:bodyPr lIns="90000" rIns="90000" tIns="45000" bIns="45000" anchor="ctr">
+            <a:normAutofit/>
+          </a:bodyPr>
+          <a:p>
+            <a:pPr algn="ctr">
+              <a:lnSpc>
+                <a:spcPct val="100000"/>
+              </a:lnSpc>
+              <a:spcBef>
+                <a:spcPts val="921"/>
+              </a:spcBef>
+            </a:pPr>
+            <a:r>
+              <a:rPr b="1" lang="en-CA" sz="4600" spc="-1" strike="noStrike">
+                <a:solidFill>
+                  <a:srgbClr val="146e83"/>
+                </a:solidFill>
+                <a:latin typeface="Calibri"/>
+                <a:ea typeface="DejaVu Sans"/>
+              </a:rPr>
+              <a:t>QUESTIONS?</a:t>
+            </a:r>
+            <a:endParaRPr b="0" lang="en-CA" sz="4600" spc="-1" strike="noStrike">
+              <a:latin typeface="Arial"/>
+            </a:endParaRPr>
+          </a:p>
+        </p:txBody>
+      </p:sp>
+    </p:spTree>
+  </p:cSld>
+  <p:timing>
+    <p:tnLst>
+      <p:par>
+        <p:cTn id="37" dur="indefinite" restart="never" nodeType="tmRoot">
+          <p:childTnLst>
+            <p:seq>
+              <p:cTn id="38" dur="indefinite" nodeType="mainSeq"/>
               <p:prevCondLst>
                 <p:cond delay="0" evt="onPrev">
                   <p:tgtEl>
@@ -9708,7 +10224,7 @@
         <p:spPr>
           <a:xfrm>
             <a:off x="432000" y="1484640"/>
-            <a:ext cx="8275320" cy="5215320"/>
+            <a:ext cx="8274960" cy="5214960"/>
           </a:xfrm>
           <a:prstGeom prst="rect">
             <a:avLst/>
@@ -9742,7 +10258,7 @@
             </a:endParaRPr>
           </a:p>
           <a:p>
-            <a:pPr marL="343080" indent="-338400">
+            <a:pPr marL="343080" indent="-338040">
               <a:lnSpc>
                 <a:spcPct val="100000"/>
               </a:lnSpc>
@@ -9770,7 +10286,7 @@
             </a:endParaRPr>
           </a:p>
           <a:p>
-            <a:pPr marL="343080" indent="-338400">
+            <a:pPr marL="343080" indent="-338040">
               <a:lnSpc>
                 <a:spcPct val="100000"/>
               </a:lnSpc>
@@ -9798,7 +10314,7 @@
             </a:endParaRPr>
           </a:p>
           <a:p>
-            <a:pPr marL="343080" indent="-338400">
+            <a:pPr marL="343080" indent="-338040">
               <a:lnSpc>
                 <a:spcPct val="100000"/>
               </a:lnSpc>
@@ -9826,7 +10342,7 @@
             </a:endParaRPr>
           </a:p>
           <a:p>
-            <a:pPr marL="343080" indent="-338400">
+            <a:pPr marL="343080" indent="-338040">
               <a:lnSpc>
                 <a:spcPct val="100000"/>
               </a:lnSpc>
@@ -9854,7 +10370,7 @@
             </a:endParaRPr>
           </a:p>
           <a:p>
-            <a:pPr marL="343080" indent="-338400">
+            <a:pPr marL="343080" indent="-338040">
               <a:lnSpc>
                 <a:spcPct val="100000"/>
               </a:lnSpc>
@@ -9882,7 +10398,7 @@
             </a:endParaRPr>
           </a:p>
           <a:p>
-            <a:pPr marL="343080" indent="-338400">
+            <a:pPr marL="343080" indent="-338040">
               <a:lnSpc>
                 <a:spcPct val="100000"/>
               </a:lnSpc>
@@ -9910,7 +10426,7 @@
             </a:endParaRPr>
           </a:p>
           <a:p>
-            <a:pPr marL="343080" indent="-338400">
+            <a:pPr marL="343080" indent="-338040">
               <a:lnSpc>
                 <a:spcPct val="100000"/>
               </a:lnSpc>
@@ -9938,7 +10454,7 @@
             </a:endParaRPr>
           </a:p>
           <a:p>
-            <a:pPr marL="343080" indent="-338400">
+            <a:pPr marL="343080" indent="-338040">
               <a:lnSpc>
                 <a:spcPct val="100000"/>
               </a:lnSpc>
@@ -9966,7 +10482,7 @@
             </a:endParaRPr>
           </a:p>
           <a:p>
-            <a:pPr marL="343080" indent="-338400">
+            <a:pPr marL="343080" indent="-338040">
               <a:lnSpc>
                 <a:spcPct val="100000"/>
               </a:lnSpc>
@@ -9994,7 +10510,7 @@
             </a:endParaRPr>
           </a:p>
           <a:p>
-            <a:pPr marL="343080" indent="-338400">
+            <a:pPr marL="343080" indent="-338040">
               <a:lnSpc>
                 <a:spcPct val="100000"/>
               </a:lnSpc>
@@ -10022,7 +10538,7 @@
             </a:endParaRPr>
           </a:p>
           <a:p>
-            <a:pPr marL="343080" indent="-338400">
+            <a:pPr marL="343080" indent="-338040">
               <a:lnSpc>
                 <a:spcPct val="100000"/>
               </a:lnSpc>
@@ -10050,7 +10566,7 @@
             </a:endParaRPr>
           </a:p>
           <a:p>
-            <a:pPr marL="343080" indent="-338400">
+            <a:pPr marL="343080" indent="-338040">
               <a:lnSpc>
                 <a:spcPct val="100000"/>
               </a:lnSpc>
@@ -10078,7 +10594,7 @@
             </a:endParaRPr>
           </a:p>
           <a:p>
-            <a:pPr marL="343080" indent="-338400">
+            <a:pPr marL="343080" indent="-338040">
               <a:lnSpc>
                 <a:spcPct val="100000"/>
               </a:lnSpc>
@@ -10152,7 +10668,7 @@
         <p:spPr>
           <a:xfrm>
             <a:off x="432000" y="0"/>
-            <a:ext cx="7447680" cy="1179720"/>
+            <a:ext cx="7447320" cy="1179360"/>
           </a:xfrm>
           <a:prstGeom prst="rect">
             <a:avLst/>
@@ -10213,7 +10729,7 @@
         <p:spPr>
           <a:xfrm>
             <a:off x="0" y="0"/>
-            <a:ext cx="246960" cy="1191960"/>
+            <a:ext cx="246600" cy="1191600"/>
           </a:xfrm>
           <a:prstGeom prst="rect">
             <a:avLst/>
@@ -10339,7 +10855,7 @@
         <p:spPr>
           <a:xfrm>
             <a:off x="432000" y="1484640"/>
-            <a:ext cx="8275320" cy="5215320"/>
+            <a:ext cx="8274960" cy="5214960"/>
           </a:xfrm>
           <a:prstGeom prst="rect">
             <a:avLst/>
@@ -10396,7 +10912,7 @@
             </a:endParaRPr>
           </a:p>
           <a:p>
-            <a:pPr marL="343080" indent="-338400">
+            <a:pPr marL="343080" indent="-338040">
               <a:lnSpc>
                 <a:spcPct val="100000"/>
               </a:lnSpc>
@@ -10424,7 +10940,7 @@
             </a:endParaRPr>
           </a:p>
           <a:p>
-            <a:pPr marL="343080" indent="-338400">
+            <a:pPr marL="343080" indent="-338040">
               <a:lnSpc>
                 <a:spcPct val="100000"/>
               </a:lnSpc>
@@ -10452,7 +10968,7 @@
             </a:endParaRPr>
           </a:p>
           <a:p>
-            <a:pPr marL="343080" indent="-338400">
+            <a:pPr marL="343080" indent="-338040">
               <a:lnSpc>
                 <a:spcPct val="100000"/>
               </a:lnSpc>
@@ -10480,7 +10996,7 @@
             </a:endParaRPr>
           </a:p>
           <a:p>
-            <a:pPr marL="343080" indent="-338400">
+            <a:pPr marL="343080" indent="-338040">
               <a:lnSpc>
                 <a:spcPct val="100000"/>
               </a:lnSpc>
@@ -10531,7 +11047,7 @@
         <p:spPr>
           <a:xfrm>
             <a:off x="432000" y="0"/>
-            <a:ext cx="7447680" cy="1179720"/>
+            <a:ext cx="7447320" cy="1179360"/>
           </a:xfrm>
           <a:prstGeom prst="rect">
             <a:avLst/>
@@ -10592,7 +11108,7 @@
         <p:spPr>
           <a:xfrm>
             <a:off x="0" y="0"/>
-            <a:ext cx="246960" cy="1191960"/>
+            <a:ext cx="246600" cy="1191600"/>
           </a:xfrm>
           <a:prstGeom prst="rect">
             <a:avLst/>
@@ -10718,7 +11234,7 @@
         <p:spPr>
           <a:xfrm>
             <a:off x="432000" y="13680"/>
-            <a:ext cx="7447680" cy="1179720"/>
+            <a:ext cx="7447320" cy="1179360"/>
           </a:xfrm>
           <a:prstGeom prst="rect">
             <a:avLst/>
@@ -10789,7 +11305,7 @@
         <p:spPr>
           <a:xfrm>
             <a:off x="0" y="0"/>
-            <a:ext cx="246960" cy="1191960"/>
+            <a:ext cx="246600" cy="1191600"/>
           </a:xfrm>
           <a:prstGeom prst="rect">
             <a:avLst/>
@@ -10859,7 +11375,7 @@
         <p:spPr>
           <a:xfrm>
             <a:off x="457200" y="273600"/>
-            <a:ext cx="8226000" cy="5304600"/>
+            <a:ext cx="8225640" cy="5304240"/>
           </a:xfrm>
           <a:prstGeom prst="rect">
             <a:avLst/>
@@ -10908,7 +11424,7 @@
         <p:spPr>
           <a:xfrm>
             <a:off x="576000" y="1728000"/>
-            <a:ext cx="6764760" cy="2390760"/>
+            <a:ext cx="6764400" cy="2390400"/>
           </a:xfrm>
           <a:prstGeom prst="rect">
             <a:avLst/>
@@ -10957,7 +11473,7 @@
             </a:endParaRPr>
           </a:p>
           <a:p>
-            <a:pPr marL="216000" indent="-212760">
+            <a:pPr marL="216000" indent="-212400">
               <a:lnSpc>
                 <a:spcPct val="100000"/>
               </a:lnSpc>
@@ -10993,7 +11509,7 @@
             </a:endParaRPr>
           </a:p>
           <a:p>
-            <a:pPr marL="216000" indent="-212760">
+            <a:pPr marL="216000" indent="-212400">
               <a:lnSpc>
                 <a:spcPct val="100000"/>
               </a:lnSpc>
@@ -11029,7 +11545,7 @@
             </a:endParaRPr>
           </a:p>
           <a:p>
-            <a:pPr marL="216000" indent="-212760">
+            <a:pPr marL="216000" indent="-212400">
               <a:lnSpc>
                 <a:spcPct val="100000"/>
               </a:lnSpc>
@@ -11141,7 +11657,7 @@
         <p:spPr>
           <a:xfrm>
             <a:off x="432000" y="13680"/>
-            <a:ext cx="7447680" cy="1179720"/>
+            <a:ext cx="7447320" cy="1179360"/>
           </a:xfrm>
           <a:prstGeom prst="rect">
             <a:avLst/>
@@ -11212,7 +11728,7 @@
         <p:spPr>
           <a:xfrm>
             <a:off x="0" y="0"/>
-            <a:ext cx="246960" cy="1191960"/>
+            <a:ext cx="246600" cy="1191600"/>
           </a:xfrm>
           <a:prstGeom prst="rect">
             <a:avLst/>
@@ -11282,7 +11798,7 @@
         <p:spPr>
           <a:xfrm>
             <a:off x="457200" y="273600"/>
-            <a:ext cx="8226000" cy="5304600"/>
+            <a:ext cx="8225640" cy="5304240"/>
           </a:xfrm>
           <a:prstGeom prst="rect">
             <a:avLst/>
@@ -11331,7 +11847,7 @@
         <p:spPr>
           <a:xfrm>
             <a:off x="576000" y="1728000"/>
-            <a:ext cx="6764760" cy="2390760"/>
+            <a:ext cx="6764400" cy="2390400"/>
           </a:xfrm>
           <a:prstGeom prst="rect">
             <a:avLst/>
@@ -11380,7 +11896,7 @@
             </a:endParaRPr>
           </a:p>
           <a:p>
-            <a:pPr marL="216000" indent="-212760">
+            <a:pPr marL="216000" indent="-212400">
               <a:lnSpc>
                 <a:spcPct val="100000"/>
               </a:lnSpc>
@@ -11416,7 +11932,7 @@
             </a:endParaRPr>
           </a:p>
           <a:p>
-            <a:pPr marL="216000" indent="-212760">
+            <a:pPr marL="216000" indent="-212400">
               <a:lnSpc>
                 <a:spcPct val="100000"/>
               </a:lnSpc>
@@ -11452,7 +11968,7 @@
             </a:endParaRPr>
           </a:p>
           <a:p>
-            <a:pPr marL="216000" indent="-212760">
+            <a:pPr marL="216000" indent="-212400">
               <a:lnSpc>
                 <a:spcPct val="100000"/>
               </a:lnSpc>
@@ -11478,7 +11994,7 @@
             </a:endParaRPr>
           </a:p>
           <a:p>
-            <a:pPr lvl="1" marL="432000" indent="-213120">
+            <a:pPr lvl="1" marL="432000" indent="-212760">
               <a:lnSpc>
                 <a:spcPct val="100000"/>
               </a:lnSpc>
@@ -11580,7 +12096,7 @@
         <p:spPr>
           <a:xfrm>
             <a:off x="432000" y="13680"/>
-            <a:ext cx="7447680" cy="1179720"/>
+            <a:ext cx="7447320" cy="1179360"/>
           </a:xfrm>
           <a:prstGeom prst="rect">
             <a:avLst/>
@@ -11651,7 +12167,7 @@
         <p:spPr>
           <a:xfrm>
             <a:off x="0" y="0"/>
-            <a:ext cx="246960" cy="1191960"/>
+            <a:ext cx="246600" cy="1191600"/>
           </a:xfrm>
           <a:prstGeom prst="rect">
             <a:avLst/>
@@ -11721,7 +12237,7 @@
         <p:spPr>
           <a:xfrm>
             <a:off x="457200" y="273600"/>
-            <a:ext cx="8226000" cy="5304600"/>
+            <a:ext cx="8225640" cy="5304240"/>
           </a:xfrm>
           <a:prstGeom prst="rect">
             <a:avLst/>
@@ -11770,7 +12286,7 @@
         <p:spPr>
           <a:xfrm>
             <a:off x="576000" y="1800000"/>
-            <a:ext cx="6764760" cy="2390760"/>
+            <a:ext cx="6764400" cy="2390400"/>
           </a:xfrm>
           <a:prstGeom prst="rect">
             <a:avLst/>
@@ -12009,7 +12525,7 @@
         <p:spPr>
           <a:xfrm>
             <a:off x="432000" y="13680"/>
-            <a:ext cx="7447680" cy="1179720"/>
+            <a:ext cx="7447320" cy="1179360"/>
           </a:xfrm>
           <a:prstGeom prst="rect">
             <a:avLst/>
@@ -12080,7 +12596,7 @@
         <p:spPr>
           <a:xfrm>
             <a:off x="0" y="0"/>
-            <a:ext cx="246960" cy="1191960"/>
+            <a:ext cx="246600" cy="1191600"/>
           </a:xfrm>
           <a:prstGeom prst="rect">
             <a:avLst/>
@@ -12150,7 +12666,7 @@
         <p:spPr>
           <a:xfrm>
             <a:off x="457200" y="273600"/>
-            <a:ext cx="8226000" cy="5304600"/>
+            <a:ext cx="8225640" cy="5304240"/>
           </a:xfrm>
           <a:prstGeom prst="rect">
             <a:avLst/>
@@ -12199,7 +12715,7 @@
         <p:spPr>
           <a:xfrm>
             <a:off x="576000" y="1728000"/>
-            <a:ext cx="6764760" cy="2390760"/>
+            <a:ext cx="6764400" cy="2390400"/>
           </a:xfrm>
           <a:prstGeom prst="rect">
             <a:avLst/>
@@ -12248,7 +12764,7 @@
             </a:endParaRPr>
           </a:p>
           <a:p>
-            <a:pPr marL="216000" indent="-212760">
+            <a:pPr marL="216000" indent="-212400">
               <a:lnSpc>
                 <a:spcPct val="100000"/>
               </a:lnSpc>
@@ -12284,7 +12800,7 @@
             </a:endParaRPr>
           </a:p>
           <a:p>
-            <a:pPr marL="216000" indent="-212760">
+            <a:pPr marL="216000" indent="-212400">
               <a:lnSpc>
                 <a:spcPct val="100000"/>
               </a:lnSpc>
@@ -12310,7 +12826,7 @@
             </a:endParaRPr>
           </a:p>
           <a:p>
-            <a:pPr lvl="2" marL="648000" indent="-213120">
+            <a:pPr lvl="2" marL="648000" indent="-212760">
               <a:lnSpc>
                 <a:spcPct val="100000"/>
               </a:lnSpc>
@@ -12336,7 +12852,7 @@
             </a:endParaRPr>
           </a:p>
           <a:p>
-            <a:pPr lvl="2" marL="648000" indent="-213120">
+            <a:pPr lvl="2" marL="648000" indent="-212760">
               <a:lnSpc>
                 <a:spcPct val="100000"/>
               </a:lnSpc>
@@ -12362,7 +12878,7 @@
             </a:endParaRPr>
           </a:p>
           <a:p>
-            <a:pPr lvl="2" marL="648000" indent="-213120">
+            <a:pPr lvl="2" marL="648000" indent="-212760">
               <a:lnSpc>
                 <a:spcPct val="100000"/>
               </a:lnSpc>
@@ -12388,7 +12904,7 @@
             </a:endParaRPr>
           </a:p>
           <a:p>
-            <a:pPr lvl="2" marL="648000" indent="-213120">
+            <a:pPr lvl="2" marL="648000" indent="-212760">
               <a:lnSpc>
                 <a:spcPct val="100000"/>
               </a:lnSpc>
@@ -12414,7 +12930,7 @@
             </a:endParaRPr>
           </a:p>
           <a:p>
-            <a:pPr lvl="2" marL="648000" indent="-213120">
+            <a:pPr lvl="2" marL="648000" indent="-212760">
               <a:lnSpc>
                 <a:spcPct val="100000"/>
               </a:lnSpc>
@@ -12433,14 +12949,14 @@
                 <a:latin typeface="Arial"/>
                 <a:ea typeface="DejaVu Sans"/>
               </a:rPr>
-              <a:t>5)  Jenkins</a:t>
-            </a:r>
-            <a:endParaRPr b="0" lang="en-CA" sz="1800" spc="-1" strike="noStrike">
-              <a:latin typeface="Arial"/>
-            </a:endParaRPr>
-          </a:p>
-          <a:p>
-            <a:pPr lvl="2" marL="648000" indent="-213120">
+              <a:t>5)  Jenkins </a:t>
+            </a:r>
+            <a:endParaRPr b="0" lang="en-CA" sz="1800" spc="-1" strike="noStrike">
+              <a:latin typeface="Arial"/>
+            </a:endParaRPr>
+          </a:p>
+          <a:p>
+            <a:pPr lvl="2" marL="648000" indent="-212760">
               <a:lnSpc>
                 <a:spcPct val="100000"/>
               </a:lnSpc>
@@ -12476,7 +12992,7 @@
             </a:endParaRPr>
           </a:p>
           <a:p>
-            <a:pPr lvl="2" marL="648000" indent="-213120">
+            <a:pPr lvl="2" marL="648000" indent="-212760">
               <a:lnSpc>
                 <a:spcPct val="100000"/>
               </a:lnSpc>
@@ -12670,7 +13186,7 @@
         <p:spPr>
           <a:xfrm>
             <a:off x="432000" y="13680"/>
-            <a:ext cx="7447680" cy="1179720"/>
+            <a:ext cx="7447320" cy="1179360"/>
           </a:xfrm>
           <a:prstGeom prst="rect">
             <a:avLst/>
@@ -12741,7 +13257,7 @@
         <p:spPr>
           <a:xfrm>
             <a:off x="0" y="0"/>
-            <a:ext cx="246960" cy="1191960"/>
+            <a:ext cx="246600" cy="1191600"/>
           </a:xfrm>
           <a:prstGeom prst="rect">
             <a:avLst/>
@@ -12811,7 +13327,7 @@
         <p:spPr>
           <a:xfrm>
             <a:off x="457200" y="273600"/>
-            <a:ext cx="8226000" cy="5304600"/>
+            <a:ext cx="8225640" cy="5304240"/>
           </a:xfrm>
           <a:prstGeom prst="rect">
             <a:avLst/>
@@ -12860,7 +13376,7 @@
         <p:spPr>
           <a:xfrm>
             <a:off x="576000" y="1728000"/>
-            <a:ext cx="6764760" cy="2390760"/>
+            <a:ext cx="6764400" cy="2390400"/>
           </a:xfrm>
           <a:prstGeom prst="rect">
             <a:avLst/>
@@ -13035,7 +13551,7 @@
         <p:spPr>
           <a:xfrm>
             <a:off x="432000" y="13680"/>
-            <a:ext cx="7447680" cy="1179720"/>
+            <a:ext cx="7447320" cy="1179360"/>
           </a:xfrm>
           <a:prstGeom prst="rect">
             <a:avLst/>
@@ -13106,7 +13622,7 @@
         <p:spPr>
           <a:xfrm>
             <a:off x="0" y="0"/>
-            <a:ext cx="246960" cy="1191960"/>
+            <a:ext cx="246600" cy="1191600"/>
           </a:xfrm>
           <a:prstGeom prst="rect">
             <a:avLst/>
@@ -13176,7 +13692,7 @@
         <p:spPr>
           <a:xfrm>
             <a:off x="457200" y="273600"/>
-            <a:ext cx="8226000" cy="5304600"/>
+            <a:ext cx="8225640" cy="5304240"/>
           </a:xfrm>
           <a:prstGeom prst="rect">
             <a:avLst/>
@@ -13225,7 +13741,7 @@
         <p:spPr>
           <a:xfrm>
             <a:off x="576000" y="1728000"/>
-            <a:ext cx="6764760" cy="2390760"/>
+            <a:ext cx="6764400" cy="2390400"/>
           </a:xfrm>
           <a:prstGeom prst="rect">
             <a:avLst/>

</xml_diff>